<commit_message>
Update UG and DG diagrams
</commit_message>
<xml_diff>
--- a/docs/diagrams/SortCommandSequenceDiagram.pptx
+++ b/docs/diagrams/SortCommandSequenceDiagram.pptx
@@ -208,7 +208,7 @@
           <a:p>
             <a:fld id="{F5CC4B3F-88C1-4FFA-B1B6-F41C21DC6924}" type="datetimeFigureOut">
               <a:rPr lang="en-US" smtClean="0"/>
-              <a:t>3/21/2019</a:t>
+              <a:t>4/13/2019</a:t>
             </a:fld>
             <a:endParaRPr lang="en-US"/>
           </a:p>
@@ -654,7 +654,7 @@
           <a:p>
             <a:fld id="{78C97017-6FC3-485B-9764-EAC9E56C1D49}" type="datetimeFigureOut">
               <a:rPr lang="en-US" smtClean="0"/>
-              <a:t>3/21/2019</a:t>
+              <a:t>4/13/2019</a:t>
             </a:fld>
             <a:endParaRPr lang="en-US"/>
           </a:p>
@@ -822,7 +822,7 @@
           <a:p>
             <a:fld id="{78C97017-6FC3-485B-9764-EAC9E56C1D49}" type="datetimeFigureOut">
               <a:rPr lang="en-US" smtClean="0"/>
-              <a:t>3/21/2019</a:t>
+              <a:t>4/13/2019</a:t>
             </a:fld>
             <a:endParaRPr lang="en-US"/>
           </a:p>
@@ -1000,7 +1000,7 @@
           <a:p>
             <a:fld id="{78C97017-6FC3-485B-9764-EAC9E56C1D49}" type="datetimeFigureOut">
               <a:rPr lang="en-US" smtClean="0"/>
-              <a:t>3/21/2019</a:t>
+              <a:t>4/13/2019</a:t>
             </a:fld>
             <a:endParaRPr lang="en-US"/>
           </a:p>
@@ -1168,7 +1168,7 @@
           <a:p>
             <a:fld id="{78C97017-6FC3-485B-9764-EAC9E56C1D49}" type="datetimeFigureOut">
               <a:rPr lang="en-US" smtClean="0"/>
-              <a:t>3/21/2019</a:t>
+              <a:t>4/13/2019</a:t>
             </a:fld>
             <a:endParaRPr lang="en-US"/>
           </a:p>
@@ -1413,7 +1413,7 @@
           <a:p>
             <a:fld id="{78C97017-6FC3-485B-9764-EAC9E56C1D49}" type="datetimeFigureOut">
               <a:rPr lang="en-US" smtClean="0"/>
-              <a:t>3/21/2019</a:t>
+              <a:t>4/13/2019</a:t>
             </a:fld>
             <a:endParaRPr lang="en-US"/>
           </a:p>
@@ -1698,7 +1698,7 @@
           <a:p>
             <a:fld id="{78C97017-6FC3-485B-9764-EAC9E56C1D49}" type="datetimeFigureOut">
               <a:rPr lang="en-US" smtClean="0"/>
-              <a:t>3/21/2019</a:t>
+              <a:t>4/13/2019</a:t>
             </a:fld>
             <a:endParaRPr lang="en-US"/>
           </a:p>
@@ -2117,7 +2117,7 @@
           <a:p>
             <a:fld id="{78C97017-6FC3-485B-9764-EAC9E56C1D49}" type="datetimeFigureOut">
               <a:rPr lang="en-US" smtClean="0"/>
-              <a:t>3/21/2019</a:t>
+              <a:t>4/13/2019</a:t>
             </a:fld>
             <a:endParaRPr lang="en-US"/>
           </a:p>
@@ -2234,7 +2234,7 @@
           <a:p>
             <a:fld id="{78C97017-6FC3-485B-9764-EAC9E56C1D49}" type="datetimeFigureOut">
               <a:rPr lang="en-US" smtClean="0"/>
-              <a:t>3/21/2019</a:t>
+              <a:t>4/13/2019</a:t>
             </a:fld>
             <a:endParaRPr lang="en-US"/>
           </a:p>
@@ -2329,7 +2329,7 @@
           <a:p>
             <a:fld id="{78C97017-6FC3-485B-9764-EAC9E56C1D49}" type="datetimeFigureOut">
               <a:rPr lang="en-US" smtClean="0"/>
-              <a:t>3/21/2019</a:t>
+              <a:t>4/13/2019</a:t>
             </a:fld>
             <a:endParaRPr lang="en-US"/>
           </a:p>
@@ -2604,7 +2604,7 @@
           <a:p>
             <a:fld id="{78C97017-6FC3-485B-9764-EAC9E56C1D49}" type="datetimeFigureOut">
               <a:rPr lang="en-US" smtClean="0"/>
-              <a:t>3/21/2019</a:t>
+              <a:t>4/13/2019</a:t>
             </a:fld>
             <a:endParaRPr lang="en-US"/>
           </a:p>
@@ -2856,7 +2856,7 @@
           <a:p>
             <a:fld id="{78C97017-6FC3-485B-9764-EAC9E56C1D49}" type="datetimeFigureOut">
               <a:rPr lang="en-US" smtClean="0"/>
-              <a:t>3/21/2019</a:t>
+              <a:t>4/13/2019</a:t>
             </a:fld>
             <a:endParaRPr lang="en-US"/>
           </a:p>
@@ -3067,7 +3067,7 @@
           <a:p>
             <a:fld id="{78C97017-6FC3-485B-9764-EAC9E56C1D49}" type="datetimeFigureOut">
               <a:rPr lang="en-US" smtClean="0"/>
-              <a:t>3/21/2019</a:t>
+              <a:t>4/13/2019</a:t>
             </a:fld>
             <a:endParaRPr lang="en-US"/>
           </a:p>
@@ -3442,1465 +3442,329 @@
           <a:chExt cx="0" cy="0"/>
         </a:xfrm>
       </p:grpSpPr>
-      <p:grpSp>
-        <p:nvGrpSpPr>
-          <p:cNvPr id="166" name="组合 165">
+      <p:sp>
+        <p:nvSpPr>
+          <p:cNvPr id="180" name="Rectangle 65">
             <a:extLst>
               <a:ext uri="{FF2B5EF4-FFF2-40B4-BE49-F238E27FC236}">
-                <a16:creationId xmlns:a16="http://schemas.microsoft.com/office/drawing/2014/main" id="{673ED75C-6976-4B3E-9330-86901F686F37}"/>
+                <a16:creationId xmlns:a16="http://schemas.microsoft.com/office/drawing/2014/main" id="{34C50DF0-F393-4A70-B235-00A357064104}"/>
               </a:ext>
             </a:extLst>
           </p:cNvPr>
-          <p:cNvGrpSpPr>
-            <a:grpSpLocks/>
-          </p:cNvGrpSpPr>
+          <p:cNvSpPr/>
           <p:nvPr/>
-        </p:nvGrpSpPr>
-        <p:grpSpPr>
-          <a:xfrm>
-            <a:off x="3009106" y="1956594"/>
-            <a:ext cx="8194538" cy="4777466"/>
-            <a:chOff x="4283572" y="46850"/>
-            <a:chExt cx="8194538" cy="4777466"/>
-          </a:xfrm>
-        </p:grpSpPr>
-        <p:sp>
-          <p:nvSpPr>
-            <p:cNvPr id="81" name="Rectangle 65"/>
-            <p:cNvSpPr/>
-            <p:nvPr/>
-          </p:nvSpPr>
-          <p:spPr>
-            <a:xfrm>
-              <a:off x="4573989" y="46850"/>
-              <a:ext cx="6794708" cy="4777466"/>
-            </a:xfrm>
-            <a:prstGeom prst="roundRect">
-              <a:avLst>
-                <a:gd name="adj" fmla="val 3484"/>
-              </a:avLst>
-            </a:prstGeom>
-            <a:solidFill>
-              <a:schemeClr val="accent1">
-                <a:lumMod val="20000"/>
-                <a:lumOff val="80000"/>
-              </a:schemeClr>
-            </a:solidFill>
-            <a:ln w="19050">
-              <a:noFill/>
-            </a:ln>
-            <a:effectLst/>
-          </p:spPr>
-          <p:style>
-            <a:lnRef idx="1">
-              <a:schemeClr val="accent2"/>
-            </a:lnRef>
-            <a:fillRef idx="2">
-              <a:schemeClr val="accent2"/>
-            </a:fillRef>
-            <a:effectRef idx="1">
-              <a:schemeClr val="accent2"/>
-            </a:effectRef>
-            <a:fontRef idx="minor">
-              <a:schemeClr val="dk1"/>
-            </a:fontRef>
-          </p:style>
-          <p:txBody>
-            <a:bodyPr rtlCol="0" anchor="t"/>
-            <a:lstStyle/>
-            <a:p>
-              <a:r>
-                <a:rPr lang="en-US" sz="1200" b="1" dirty="0">
-                  <a:solidFill>
-                    <a:srgbClr val="0070C0"/>
-                  </a:solidFill>
-                </a:rPr>
-                <a:t>Logic</a:t>
-              </a:r>
-              <a:endParaRPr lang="en-SG" sz="1200" b="1" dirty="0">
+        </p:nvSpPr>
+        <p:spPr>
+          <a:xfrm>
+            <a:off x="195789" y="1850553"/>
+            <a:ext cx="10410255" cy="6202041"/>
+          </a:xfrm>
+          <a:prstGeom prst="roundRect">
+            <a:avLst>
+              <a:gd name="adj" fmla="val 3484"/>
+            </a:avLst>
+          </a:prstGeom>
+          <a:solidFill>
+            <a:schemeClr val="accent1">
+              <a:lumMod val="20000"/>
+              <a:lumOff val="80000"/>
+            </a:schemeClr>
+          </a:solidFill>
+          <a:ln w="19050">
+            <a:noFill/>
+          </a:ln>
+          <a:effectLst/>
+        </p:spPr>
+        <p:style>
+          <a:lnRef idx="1">
+            <a:schemeClr val="accent2"/>
+          </a:lnRef>
+          <a:fillRef idx="2">
+            <a:schemeClr val="accent2"/>
+          </a:fillRef>
+          <a:effectRef idx="1">
+            <a:schemeClr val="accent2"/>
+          </a:effectRef>
+          <a:fontRef idx="minor">
+            <a:schemeClr val="dk1"/>
+          </a:fontRef>
+        </p:style>
+        <p:txBody>
+          <a:bodyPr rtlCol="0" anchor="t"/>
+          <a:lstStyle/>
+          <a:p>
+            <a:r>
+              <a:rPr lang="en-US" sz="1200" b="1">
                 <a:solidFill>
                   <a:srgbClr val="0070C0"/>
                 </a:solidFill>
-              </a:endParaRPr>
-            </a:p>
-          </p:txBody>
-        </p:sp>
-        <p:sp>
-          <p:nvSpPr>
-            <p:cNvPr id="2" name="Rectangle 62"/>
-            <p:cNvSpPr/>
-            <p:nvPr/>
-          </p:nvSpPr>
-          <p:spPr>
-            <a:xfrm>
-              <a:off x="5102463" y="543946"/>
-              <a:ext cx="1455629" cy="346760"/>
-            </a:xfrm>
-            <a:prstGeom prst="rect">
-              <a:avLst/>
-            </a:prstGeom>
-            <a:solidFill>
-              <a:srgbClr val="0070C0"/>
-            </a:solidFill>
-            <a:ln w="19050">
+              </a:rPr>
+              <a:t>Logic</a:t>
+            </a:r>
+            <a:endParaRPr lang="en-SG" sz="1200" b="1" dirty="0">
               <a:solidFill>
                 <a:srgbClr val="0070C0"/>
               </a:solidFill>
-            </a:ln>
-            <a:effectLst/>
-          </p:spPr>
-          <p:style>
-            <a:lnRef idx="1">
-              <a:schemeClr val="accent2"/>
-            </a:lnRef>
-            <a:fillRef idx="2">
-              <a:schemeClr val="accent2"/>
-            </a:fillRef>
-            <a:effectRef idx="1">
-              <a:schemeClr val="accent2"/>
-            </a:effectRef>
-            <a:fontRef idx="minor">
-              <a:schemeClr val="dk1"/>
-            </a:fontRef>
-          </p:style>
-          <p:txBody>
-            <a:bodyPr rtlCol="0" anchor="ctr"/>
-            <a:lstStyle/>
-            <a:p>
-              <a:pPr algn="ctr"/>
-              <a:r>
-                <a:rPr lang="en-US" sz="1600" dirty="0">
-                  <a:solidFill>
-                    <a:schemeClr val="bg1"/>
-                  </a:solidFill>
-                </a:rPr>
-                <a:t>:LogicManager</a:t>
-              </a:r>
-              <a:endParaRPr lang="en-SG" sz="1600" dirty="0">
+            </a:endParaRPr>
+          </a:p>
+        </p:txBody>
+      </p:sp>
+      <p:sp>
+        <p:nvSpPr>
+          <p:cNvPr id="163" name="Rectangle 65">
+            <a:extLst>
+              <a:ext uri="{FF2B5EF4-FFF2-40B4-BE49-F238E27FC236}">
+                <a16:creationId xmlns:a16="http://schemas.microsoft.com/office/drawing/2014/main" id="{50596625-53D6-44DE-A260-9719015B7838}"/>
+              </a:ext>
+            </a:extLst>
+          </p:cNvPr>
+          <p:cNvSpPr/>
+          <p:nvPr/>
+        </p:nvSpPr>
+        <p:spPr>
+          <a:xfrm>
+            <a:off x="10662101" y="2371078"/>
+            <a:ext cx="5395274" cy="5654564"/>
+          </a:xfrm>
+          <a:prstGeom prst="roundRect">
+            <a:avLst>
+              <a:gd name="adj" fmla="val 3484"/>
+            </a:avLst>
+          </a:prstGeom>
+          <a:solidFill>
+            <a:schemeClr val="accent4">
+              <a:lumMod val="20000"/>
+              <a:lumOff val="80000"/>
+            </a:schemeClr>
+          </a:solidFill>
+          <a:ln w="19050">
+            <a:noFill/>
+          </a:ln>
+          <a:effectLst/>
+        </p:spPr>
+        <p:style>
+          <a:lnRef idx="1">
+            <a:schemeClr val="accent2"/>
+          </a:lnRef>
+          <a:fillRef idx="2">
+            <a:schemeClr val="accent2"/>
+          </a:fillRef>
+          <a:effectRef idx="1">
+            <a:schemeClr val="accent2"/>
+          </a:effectRef>
+          <a:fontRef idx="minor">
+            <a:schemeClr val="dk1"/>
+          </a:fontRef>
+        </p:style>
+        <p:txBody>
+          <a:bodyPr rtlCol="0" anchor="t"/>
+          <a:lstStyle/>
+          <a:p>
+            <a:r>
+              <a:rPr lang="en-US" sz="1200" b="1">
+                <a:solidFill>
+                  <a:srgbClr val="7030A0"/>
+                </a:solidFill>
+              </a:rPr>
+              <a:t>Model</a:t>
+            </a:r>
+            <a:endParaRPr lang="en-SG" sz="1200" b="1" dirty="0">
+              <a:solidFill>
+                <a:srgbClr val="7030A0"/>
+              </a:solidFill>
+            </a:endParaRPr>
+          </a:p>
+        </p:txBody>
+      </p:sp>
+      <p:sp>
+        <p:nvSpPr>
+          <p:cNvPr id="164" name="Rectangle 62">
+            <a:extLst>
+              <a:ext uri="{FF2B5EF4-FFF2-40B4-BE49-F238E27FC236}">
+                <a16:creationId xmlns:a16="http://schemas.microsoft.com/office/drawing/2014/main" id="{77DD5224-9449-4CC2-98AD-752BB6ABE6A7}"/>
+              </a:ext>
+            </a:extLst>
+          </p:cNvPr>
+          <p:cNvSpPr/>
+          <p:nvPr/>
+        </p:nvSpPr>
+        <p:spPr>
+          <a:xfrm>
+            <a:off x="12374422" y="4656945"/>
+            <a:ext cx="1911664" cy="398562"/>
+          </a:xfrm>
+          <a:prstGeom prst="rect">
+            <a:avLst/>
+          </a:prstGeom>
+          <a:solidFill>
+            <a:srgbClr val="7030A0"/>
+          </a:solidFill>
+          <a:ln w="19050">
+            <a:solidFill>
+              <a:srgbClr val="7030A0"/>
+            </a:solidFill>
+          </a:ln>
+          <a:effectLst/>
+        </p:spPr>
+        <p:style>
+          <a:lnRef idx="1">
+            <a:schemeClr val="accent2"/>
+          </a:lnRef>
+          <a:fillRef idx="2">
+            <a:schemeClr val="accent2"/>
+          </a:fillRef>
+          <a:effectRef idx="1">
+            <a:schemeClr val="accent2"/>
+          </a:effectRef>
+          <a:fontRef idx="minor">
+            <a:schemeClr val="dk1"/>
+          </a:fontRef>
+        </p:style>
+        <p:txBody>
+          <a:bodyPr rtlCol="0" anchor="ctr"/>
+          <a:lstStyle/>
+          <a:p>
+            <a:pPr algn="ctr"/>
+            <a:r>
+              <a:rPr lang="en-US" sz="1600" dirty="0">
                 <a:solidFill>
                   <a:schemeClr val="bg1"/>
                 </a:solidFill>
-              </a:endParaRPr>
-            </a:p>
-          </p:txBody>
-        </p:sp>
-        <p:sp>
-          <p:nvSpPr>
-            <p:cNvPr id="6" name="Rectangle 5"/>
-            <p:cNvSpPr/>
-            <p:nvPr/>
-          </p:nvSpPr>
-          <p:spPr>
-            <a:xfrm>
-              <a:off x="5741869" y="1258315"/>
-              <a:ext cx="181464" cy="2899165"/>
-            </a:xfrm>
-            <a:prstGeom prst="rect">
-              <a:avLst/>
-            </a:prstGeom>
+              </a:rPr>
+              <a:t>:EquipmentManager</a:t>
+            </a:r>
+            <a:endParaRPr lang="en-SG" sz="1600" dirty="0">
+              <a:solidFill>
+                <a:schemeClr val="bg1"/>
+              </a:solidFill>
+            </a:endParaRPr>
+          </a:p>
+        </p:txBody>
+      </p:sp>
+      <p:sp>
+        <p:nvSpPr>
+          <p:cNvPr id="165" name="Rectangle 164">
+            <a:extLst>
+              <a:ext uri="{FF2B5EF4-FFF2-40B4-BE49-F238E27FC236}">
+                <a16:creationId xmlns:a16="http://schemas.microsoft.com/office/drawing/2014/main" id="{3E5A8CB9-5A7E-4E87-9237-5F6F7E385661}"/>
+              </a:ext>
+            </a:extLst>
+          </p:cNvPr>
+          <p:cNvSpPr/>
+          <p:nvPr/>
+        </p:nvSpPr>
+        <p:spPr>
+          <a:xfrm>
+            <a:off x="13198195" y="5739870"/>
+            <a:ext cx="178292" cy="974453"/>
+          </a:xfrm>
+          <a:prstGeom prst="rect">
+            <a:avLst/>
+          </a:prstGeom>
+          <a:solidFill>
+            <a:srgbClr val="7030A0"/>
+          </a:solidFill>
+          <a:ln>
             <a:solidFill>
-              <a:srgbClr val="0070C0"/>
+              <a:srgbClr val="7030A0"/>
             </a:solidFill>
-            <a:ln>
-              <a:solidFill>
-                <a:srgbClr val="0070C0"/>
-              </a:solidFill>
-            </a:ln>
-            <a:effectLst/>
-          </p:spPr>
-          <p:style>
-            <a:lnRef idx="1">
-              <a:schemeClr val="accent3"/>
-            </a:lnRef>
-            <a:fillRef idx="2">
-              <a:schemeClr val="accent3"/>
-            </a:fillRef>
-            <a:effectRef idx="1">
-              <a:schemeClr val="accent3"/>
-            </a:effectRef>
-            <a:fontRef idx="minor">
-              <a:schemeClr val="dk1"/>
-            </a:fontRef>
-          </p:style>
-          <p:txBody>
-            <a:bodyPr rtlCol="0" anchor="ctr"/>
-            <a:lstStyle/>
-            <a:p>
-              <a:pPr algn="ctr"/>
-              <a:endParaRPr lang="en-SG" sz="1400"/>
-            </a:p>
-          </p:txBody>
-        </p:sp>
-        <p:sp>
-          <p:nvSpPr>
-            <p:cNvPr id="16" name="Rectangle 62"/>
-            <p:cNvSpPr/>
-            <p:nvPr/>
-          </p:nvSpPr>
-          <p:spPr>
-            <a:xfrm>
-              <a:off x="7180973" y="332890"/>
-              <a:ext cx="1945376" cy="723299"/>
-            </a:xfrm>
-            <a:prstGeom prst="rect">
-              <a:avLst/>
-            </a:prstGeom>
+          </a:ln>
+          <a:effectLst/>
+        </p:spPr>
+        <p:style>
+          <a:lnRef idx="1">
+            <a:schemeClr val="accent3"/>
+          </a:lnRef>
+          <a:fillRef idx="2">
+            <a:schemeClr val="accent3"/>
+          </a:fillRef>
+          <a:effectRef idx="1">
+            <a:schemeClr val="accent3"/>
+          </a:effectRef>
+          <a:fontRef idx="minor">
+            <a:schemeClr val="dk1"/>
+          </a:fontRef>
+        </p:style>
+        <p:txBody>
+          <a:bodyPr rtlCol="0" anchor="ctr"/>
+          <a:lstStyle/>
+          <a:p>
+            <a:pPr algn="ctr"/>
+            <a:endParaRPr lang="en-SG" sz="1400"/>
+          </a:p>
+        </p:txBody>
+      </p:sp>
+      <p:sp>
+        <p:nvSpPr>
+          <p:cNvPr id="167" name="Rectangle 62">
+            <a:extLst>
+              <a:ext uri="{FF2B5EF4-FFF2-40B4-BE49-F238E27FC236}">
+                <a16:creationId xmlns:a16="http://schemas.microsoft.com/office/drawing/2014/main" id="{F1CAA8BE-72B2-4E92-A16F-7ACC981AD510}"/>
+              </a:ext>
+            </a:extLst>
+          </p:cNvPr>
+          <p:cNvSpPr/>
+          <p:nvPr/>
+        </p:nvSpPr>
+        <p:spPr>
+          <a:xfrm>
+            <a:off x="10945814" y="4340532"/>
+            <a:ext cx="1023500" cy="844020"/>
+          </a:xfrm>
+          <a:prstGeom prst="rect">
+            <a:avLst/>
+          </a:prstGeom>
+          <a:solidFill>
+            <a:srgbClr val="7030A0"/>
+          </a:solidFill>
+          <a:ln w="19050">
             <a:solidFill>
-              <a:srgbClr val="0070C0"/>
+              <a:srgbClr val="7030A0"/>
             </a:solidFill>
-            <a:ln w="19050">
-              <a:solidFill>
-                <a:srgbClr val="0070C0"/>
-              </a:solidFill>
-            </a:ln>
-            <a:effectLst/>
-          </p:spPr>
-          <p:style>
-            <a:lnRef idx="1">
-              <a:schemeClr val="accent2"/>
-            </a:lnRef>
-            <a:fillRef idx="2">
-              <a:schemeClr val="accent2"/>
-            </a:fillRef>
-            <a:effectRef idx="1">
-              <a:schemeClr val="accent2"/>
-            </a:effectRef>
-            <a:fontRef idx="minor">
-              <a:schemeClr val="dk1"/>
-            </a:fontRef>
-          </p:style>
-          <p:txBody>
-            <a:bodyPr rtlCol="0" anchor="ctr"/>
-            <a:lstStyle/>
-            <a:p>
-              <a:pPr algn="ctr"/>
-              <a:r>
-                <a:rPr lang="en-US" sz="1600" dirty="0">
-                  <a:solidFill>
-                    <a:schemeClr val="bg1"/>
-                  </a:solidFill>
-                </a:rPr>
-                <a:t>:EquipmentManager</a:t>
-              </a:r>
-            </a:p>
-            <a:p>
-              <a:pPr algn="ctr"/>
-              <a:r>
-                <a:rPr lang="en-US" sz="1600" dirty="0">
-                  <a:solidFill>
-                    <a:schemeClr val="bg1"/>
-                  </a:solidFill>
-                </a:rPr>
-                <a:t>Parser</a:t>
-              </a:r>
-              <a:endParaRPr lang="en-SG" sz="1600" dirty="0">
+          </a:ln>
+          <a:effectLst/>
+        </p:spPr>
+        <p:style>
+          <a:lnRef idx="1">
+            <a:schemeClr val="accent2"/>
+          </a:lnRef>
+          <a:fillRef idx="2">
+            <a:schemeClr val="accent2"/>
+          </a:fillRef>
+          <a:effectRef idx="1">
+            <a:schemeClr val="accent2"/>
+          </a:effectRef>
+          <a:fontRef idx="minor">
+            <a:schemeClr val="dk1"/>
+          </a:fontRef>
+        </p:style>
+        <p:txBody>
+          <a:bodyPr rtlCol="0" anchor="ctr"/>
+          <a:lstStyle/>
+          <a:p>
+            <a:pPr algn="ctr"/>
+            <a:r>
+              <a:rPr lang="en-US" sz="1600" dirty="0">
                 <a:solidFill>
                   <a:schemeClr val="bg1"/>
                 </a:solidFill>
-              </a:endParaRPr>
-            </a:p>
-          </p:txBody>
-        </p:sp>
-        <p:cxnSp>
-          <p:nvCxnSpPr>
-            <p:cNvPr id="17" name="Straight Connector 16"/>
-            <p:cNvCxnSpPr>
-              <a:cxnSpLocks/>
-            </p:cNvCxnSpPr>
-            <p:nvPr/>
-          </p:nvCxnSpPr>
-          <p:spPr>
-            <a:xfrm>
-              <a:off x="8269901" y="907617"/>
-              <a:ext cx="0" cy="1482984"/>
-            </a:xfrm>
-            <a:prstGeom prst="line">
-              <a:avLst/>
-            </a:prstGeom>
-            <a:ln w="19050">
+              </a:rPr>
+              <a:t>:Model</a:t>
+            </a:r>
+            <a:endParaRPr lang="en-SG" sz="1600" dirty="0">
               <a:solidFill>
-                <a:srgbClr val="0070C0"/>
+                <a:schemeClr val="bg1"/>
               </a:solidFill>
-              <a:prstDash val="sysDash"/>
-            </a:ln>
-            <a:effectLst/>
-          </p:spPr>
-          <p:style>
-            <a:lnRef idx="1">
-              <a:schemeClr val="accent1"/>
-            </a:lnRef>
-            <a:fillRef idx="2">
-              <a:schemeClr val="accent1"/>
-            </a:fillRef>
-            <a:effectRef idx="1">
-              <a:schemeClr val="accent1"/>
-            </a:effectRef>
-            <a:fontRef idx="minor">
-              <a:schemeClr val="dk1"/>
-            </a:fontRef>
-          </p:style>
-        </p:cxnSp>
-        <p:sp>
-          <p:nvSpPr>
-            <p:cNvPr id="18" name="Rectangle 17"/>
-            <p:cNvSpPr/>
-            <p:nvPr/>
-          </p:nvSpPr>
-          <p:spPr>
-            <a:xfrm>
-              <a:off x="8197894" y="1365810"/>
-              <a:ext cx="154408" cy="767790"/>
-            </a:xfrm>
-            <a:prstGeom prst="rect">
-              <a:avLst/>
-            </a:prstGeom>
-            <a:solidFill>
-              <a:srgbClr val="0070C0"/>
-            </a:solidFill>
-            <a:ln>
-              <a:solidFill>
-                <a:srgbClr val="0070C0"/>
-              </a:solidFill>
-            </a:ln>
-            <a:effectLst/>
-          </p:spPr>
-          <p:style>
-            <a:lnRef idx="1">
-              <a:schemeClr val="accent3"/>
-            </a:lnRef>
-            <a:fillRef idx="2">
-              <a:schemeClr val="accent3"/>
-            </a:fillRef>
-            <a:effectRef idx="1">
-              <a:schemeClr val="accent3"/>
-            </a:effectRef>
-            <a:fontRef idx="minor">
-              <a:schemeClr val="dk1"/>
-            </a:fontRef>
-          </p:style>
-          <p:txBody>
-            <a:bodyPr rtlCol="0" anchor="ctr"/>
-            <a:lstStyle/>
-            <a:p>
-              <a:pPr algn="ctr"/>
-              <a:endParaRPr lang="en-SG" sz="1400"/>
-            </a:p>
-          </p:txBody>
-        </p:sp>
-        <p:cxnSp>
-          <p:nvCxnSpPr>
-            <p:cNvPr id="20" name="Straight Connector 19"/>
-            <p:cNvCxnSpPr>
-              <a:cxnSpLocks/>
-              <a:stCxn id="21" idx="0"/>
-            </p:cNvCxnSpPr>
-            <p:nvPr/>
-          </p:nvCxnSpPr>
-          <p:spPr>
-            <a:xfrm flipH="1">
-              <a:off x="9821396" y="1613633"/>
-              <a:ext cx="1004" cy="2380737"/>
-            </a:xfrm>
-            <a:prstGeom prst="line">
-              <a:avLst/>
-            </a:prstGeom>
-            <a:ln w="19050">
-              <a:solidFill>
-                <a:srgbClr val="0070C0"/>
-              </a:solidFill>
-              <a:prstDash val="sysDash"/>
-            </a:ln>
-            <a:effectLst/>
-          </p:spPr>
-          <p:style>
-            <a:lnRef idx="1">
-              <a:schemeClr val="accent1"/>
-            </a:lnRef>
-            <a:fillRef idx="2">
-              <a:schemeClr val="accent1"/>
-            </a:fillRef>
-            <a:effectRef idx="1">
-              <a:schemeClr val="accent1"/>
-            </a:effectRef>
-            <a:fontRef idx="minor">
-              <a:schemeClr val="dk1"/>
-            </a:fontRef>
-          </p:style>
-        </p:cxnSp>
-        <p:sp>
-          <p:nvSpPr>
-            <p:cNvPr id="21" name="Rectangle 20"/>
-            <p:cNvSpPr/>
-            <p:nvPr/>
-          </p:nvSpPr>
-          <p:spPr>
-            <a:xfrm>
-              <a:off x="9745196" y="1613633"/>
-              <a:ext cx="154408" cy="507604"/>
-            </a:xfrm>
-            <a:prstGeom prst="rect">
-              <a:avLst/>
-            </a:prstGeom>
-            <a:solidFill>
-              <a:srgbClr val="0070C0"/>
-            </a:solidFill>
-            <a:ln>
-              <a:solidFill>
-                <a:srgbClr val="0070C0"/>
-              </a:solidFill>
-            </a:ln>
-            <a:effectLst/>
-          </p:spPr>
-          <p:style>
-            <a:lnRef idx="1">
-              <a:schemeClr val="accent3"/>
-            </a:lnRef>
-            <a:fillRef idx="2">
-              <a:schemeClr val="accent3"/>
-            </a:fillRef>
-            <a:effectRef idx="1">
-              <a:schemeClr val="accent3"/>
-            </a:effectRef>
-            <a:fontRef idx="minor">
-              <a:schemeClr val="dk1"/>
-            </a:fontRef>
-          </p:style>
-          <p:txBody>
-            <a:bodyPr rtlCol="0" anchor="ctr"/>
-            <a:lstStyle/>
-            <a:p>
-              <a:pPr algn="ctr"/>
-              <a:endParaRPr lang="en-SG" sz="1400"/>
-            </a:p>
-          </p:txBody>
-        </p:sp>
-        <p:cxnSp>
-          <p:nvCxnSpPr>
-            <p:cNvPr id="28" name="Straight Arrow Connector 27"/>
-            <p:cNvCxnSpPr>
-              <a:cxnSpLocks/>
-            </p:cNvCxnSpPr>
-            <p:nvPr/>
-          </p:nvCxnSpPr>
-          <p:spPr>
-            <a:xfrm flipV="1">
-              <a:off x="8355286" y="1512344"/>
-              <a:ext cx="922392" cy="1"/>
-            </a:xfrm>
-            <a:prstGeom prst="straightConnector1">
-              <a:avLst/>
-            </a:prstGeom>
-            <a:ln w="19050">
-              <a:solidFill>
-                <a:srgbClr val="0070C0"/>
-              </a:solidFill>
-              <a:tailEnd type="arrow"/>
-            </a:ln>
-          </p:spPr>
-          <p:style>
-            <a:lnRef idx="1">
-              <a:schemeClr val="accent1"/>
-            </a:lnRef>
-            <a:fillRef idx="0">
-              <a:schemeClr val="accent1"/>
-            </a:fillRef>
-            <a:effectRef idx="0">
-              <a:schemeClr val="accent1"/>
-            </a:effectRef>
-            <a:fontRef idx="minor">
-              <a:schemeClr val="tx1"/>
-            </a:fontRef>
-          </p:style>
-        </p:cxnSp>
-        <p:sp>
-          <p:nvSpPr>
-            <p:cNvPr id="29" name="TextBox 28"/>
-            <p:cNvSpPr txBox="1"/>
-            <p:nvPr/>
-          </p:nvSpPr>
-          <p:spPr>
-            <a:xfrm>
-              <a:off x="7462739" y="2484071"/>
-              <a:ext cx="855809" cy="215444"/>
-            </a:xfrm>
-            <a:prstGeom prst="rect">
-              <a:avLst/>
-            </a:prstGeom>
-            <a:noFill/>
-          </p:spPr>
-          <p:txBody>
-            <a:bodyPr wrap="square" lIns="0" tIns="0" rIns="0" bIns="0" rtlCol="0">
-              <a:spAutoFit/>
-            </a:bodyPr>
-            <a:lstStyle>
-              <a:defPPr>
-                <a:defRPr lang="en-US"/>
-              </a:defPPr>
-              <a:lvl1pPr algn="r">
-                <a:defRPr sz="1400">
-                  <a:solidFill>
-                    <a:srgbClr val="0070C0"/>
-                  </a:solidFill>
-                </a:defRPr>
-              </a:lvl1pPr>
-            </a:lstStyle>
-            <a:p>
-              <a:r>
-                <a:rPr lang="en-US" dirty="0"/>
-                <a:t>execute()</a:t>
-              </a:r>
-            </a:p>
-          </p:txBody>
-        </p:sp>
-        <p:cxnSp>
-          <p:nvCxnSpPr>
-            <p:cNvPr id="34" name="Straight Arrow Connector 33"/>
-            <p:cNvCxnSpPr>
-              <a:cxnSpLocks/>
-            </p:cNvCxnSpPr>
-            <p:nvPr/>
-          </p:nvCxnSpPr>
-          <p:spPr>
-            <a:xfrm>
-              <a:off x="8328422" y="2100094"/>
-              <a:ext cx="1492974" cy="0"/>
-            </a:xfrm>
-            <a:prstGeom prst="straightConnector1">
-              <a:avLst/>
-            </a:prstGeom>
-            <a:ln w="19050">
-              <a:solidFill>
-                <a:srgbClr val="0070C0"/>
-              </a:solidFill>
-              <a:prstDash val="sysDash"/>
-              <a:headEnd type="arrow" w="med" len="med"/>
-              <a:tailEnd type="none" w="med" len="med"/>
-            </a:ln>
-          </p:spPr>
-          <p:style>
-            <a:lnRef idx="1">
-              <a:schemeClr val="accent1"/>
-            </a:lnRef>
-            <a:fillRef idx="0">
-              <a:schemeClr val="accent1"/>
-            </a:fillRef>
-            <a:effectRef idx="0">
-              <a:schemeClr val="accent1"/>
-            </a:effectRef>
-            <a:fontRef idx="minor">
-              <a:schemeClr val="tx1"/>
-            </a:fontRef>
-          </p:style>
-        </p:cxnSp>
-        <p:cxnSp>
-          <p:nvCxnSpPr>
-            <p:cNvPr id="35" name="Straight Arrow Connector 34"/>
-            <p:cNvCxnSpPr>
-              <a:cxnSpLocks/>
-            </p:cNvCxnSpPr>
-            <p:nvPr/>
-          </p:nvCxnSpPr>
-          <p:spPr>
-            <a:xfrm>
-              <a:off x="5910669" y="2133600"/>
-              <a:ext cx="2348067" cy="0"/>
-            </a:xfrm>
-            <a:prstGeom prst="straightConnector1">
-              <a:avLst/>
-            </a:prstGeom>
-            <a:ln w="19050">
-              <a:solidFill>
-                <a:srgbClr val="0070C0"/>
-              </a:solidFill>
-              <a:prstDash val="sysDash"/>
-              <a:headEnd type="arrow" w="med" len="med"/>
-              <a:tailEnd type="none" w="med" len="med"/>
-            </a:ln>
-          </p:spPr>
-          <p:style>
-            <a:lnRef idx="1">
-              <a:schemeClr val="accent1"/>
-            </a:lnRef>
-            <a:fillRef idx="0">
-              <a:schemeClr val="accent1"/>
-            </a:fillRef>
-            <a:effectRef idx="0">
-              <a:schemeClr val="accent1"/>
-            </a:effectRef>
-            <a:fontRef idx="minor">
-              <a:schemeClr val="tx1"/>
-            </a:fontRef>
-          </p:style>
-        </p:cxnSp>
-        <p:cxnSp>
-          <p:nvCxnSpPr>
-            <p:cNvPr id="37" name="Straight Arrow Connector 36"/>
-            <p:cNvCxnSpPr>
-              <a:cxnSpLocks/>
-            </p:cNvCxnSpPr>
-            <p:nvPr/>
-          </p:nvCxnSpPr>
-          <p:spPr>
-            <a:xfrm>
-              <a:off x="4283572" y="4157480"/>
-              <a:ext cx="1530791" cy="14"/>
-            </a:xfrm>
-            <a:prstGeom prst="straightConnector1">
-              <a:avLst/>
-            </a:prstGeom>
-            <a:ln w="19050">
-              <a:solidFill>
-                <a:schemeClr val="accent1"/>
-              </a:solidFill>
-              <a:prstDash val="sysDash"/>
-              <a:headEnd type="arrow" w="med" len="med"/>
-              <a:tailEnd type="none" w="med" len="med"/>
-            </a:ln>
-          </p:spPr>
-          <p:style>
-            <a:lnRef idx="1">
-              <a:schemeClr val="accent1"/>
-            </a:lnRef>
-            <a:fillRef idx="0">
-              <a:schemeClr val="accent1"/>
-            </a:fillRef>
-            <a:effectRef idx="0">
-              <a:schemeClr val="accent1"/>
-            </a:effectRef>
-            <a:fontRef idx="minor">
-              <a:schemeClr val="tx1"/>
-            </a:fontRef>
-          </p:style>
-        </p:cxnSp>
-        <p:sp>
-          <p:nvSpPr>
-            <p:cNvPr id="65" name="Rectangle 64"/>
-            <p:cNvSpPr/>
-            <p:nvPr/>
-          </p:nvSpPr>
-          <p:spPr>
-            <a:xfrm>
-              <a:off x="9742829" y="2659751"/>
-              <a:ext cx="149460" cy="1150818"/>
-            </a:xfrm>
-            <a:prstGeom prst="rect">
-              <a:avLst/>
-            </a:prstGeom>
-            <a:solidFill>
-              <a:srgbClr val="0070C0"/>
-            </a:solidFill>
-            <a:ln>
-              <a:solidFill>
-                <a:srgbClr val="0070C0"/>
-              </a:solidFill>
-            </a:ln>
-            <a:effectLst/>
-          </p:spPr>
-          <p:style>
-            <a:lnRef idx="1">
-              <a:schemeClr val="accent3"/>
-            </a:lnRef>
-            <a:fillRef idx="2">
-              <a:schemeClr val="accent3"/>
-            </a:fillRef>
-            <a:effectRef idx="1">
-              <a:schemeClr val="accent3"/>
-            </a:effectRef>
-            <a:fontRef idx="minor">
-              <a:schemeClr val="dk1"/>
-            </a:fontRef>
-          </p:style>
-          <p:txBody>
-            <a:bodyPr rtlCol="0" anchor="ctr"/>
-            <a:lstStyle/>
-            <a:p>
-              <a:pPr algn="ctr"/>
-              <a:endParaRPr lang="en-SG" sz="1400"/>
-            </a:p>
-          </p:txBody>
-        </p:sp>
-        <p:sp>
-          <p:nvSpPr>
-            <p:cNvPr id="80" name="TextBox 79"/>
-            <p:cNvSpPr txBox="1"/>
-            <p:nvPr/>
-          </p:nvSpPr>
-          <p:spPr>
-            <a:xfrm>
-              <a:off x="6058679" y="1106150"/>
-              <a:ext cx="1945376" cy="215444"/>
-            </a:xfrm>
-            <a:prstGeom prst="rect">
-              <a:avLst/>
-            </a:prstGeom>
-            <a:noFill/>
-          </p:spPr>
-          <p:txBody>
-            <a:bodyPr wrap="square" lIns="0" tIns="0" rIns="0" bIns="0" rtlCol="0">
-              <a:spAutoFit/>
-            </a:bodyPr>
-            <a:lstStyle>
-              <a:defPPr>
-                <a:defRPr lang="en-US"/>
-              </a:defPPr>
-              <a:lvl1pPr algn="r">
-                <a:defRPr sz="1400">
-                  <a:solidFill>
-                    <a:srgbClr val="0070C0"/>
-                  </a:solidFill>
-                </a:defRPr>
-              </a:lvl1pPr>
-            </a:lstStyle>
-            <a:p>
-              <a:r>
-                <a:rPr lang="en-US" dirty="0"/>
-                <a:t>parseCommand(“sort”)</a:t>
-              </a:r>
-            </a:p>
-          </p:txBody>
-        </p:sp>
-        <p:sp>
-          <p:nvSpPr>
-            <p:cNvPr id="82" name="TextBox 81"/>
-            <p:cNvSpPr txBox="1"/>
-            <p:nvPr/>
-          </p:nvSpPr>
-          <p:spPr>
-            <a:xfrm>
-              <a:off x="7496064" y="3547894"/>
-              <a:ext cx="621216" cy="215444"/>
-            </a:xfrm>
-            <a:prstGeom prst="rect">
-              <a:avLst/>
-            </a:prstGeom>
-            <a:noFill/>
-          </p:spPr>
-          <p:txBody>
-            <a:bodyPr wrap="square" lIns="0" tIns="0" rIns="0" bIns="0" rtlCol="0">
-              <a:spAutoFit/>
-            </a:bodyPr>
-            <a:lstStyle>
-              <a:defPPr>
-                <a:defRPr lang="en-US"/>
-              </a:defPPr>
-              <a:lvl1pPr algn="r">
-                <a:defRPr sz="1400">
-                  <a:solidFill>
-                    <a:srgbClr val="0070C0"/>
-                  </a:solidFill>
-                </a:defRPr>
-              </a:lvl1pPr>
-            </a:lstStyle>
-            <a:p>
-              <a:r>
-                <a:rPr lang="en-US" dirty="0"/>
-                <a:t>result</a:t>
-              </a:r>
-            </a:p>
-          </p:txBody>
-        </p:sp>
-        <p:sp>
-          <p:nvSpPr>
-            <p:cNvPr id="83" name="TextBox 82"/>
-            <p:cNvSpPr txBox="1"/>
-            <p:nvPr/>
-          </p:nvSpPr>
-          <p:spPr>
-            <a:xfrm>
-              <a:off x="4740772" y="3852694"/>
-              <a:ext cx="762000" cy="215444"/>
-            </a:xfrm>
-            <a:prstGeom prst="rect">
-              <a:avLst/>
-            </a:prstGeom>
-            <a:noFill/>
-          </p:spPr>
-          <p:txBody>
-            <a:bodyPr wrap="square" lIns="0" tIns="0" rIns="0" bIns="0" rtlCol="0">
-              <a:spAutoFit/>
-            </a:bodyPr>
-            <a:lstStyle>
-              <a:defPPr>
-                <a:defRPr lang="en-US"/>
-              </a:defPPr>
-              <a:lvl1pPr algn="r">
-                <a:defRPr sz="1400">
-                  <a:solidFill>
-                    <a:srgbClr val="0070C0"/>
-                  </a:solidFill>
-                </a:defRPr>
-              </a:lvl1pPr>
-            </a:lstStyle>
-            <a:p>
-              <a:r>
-                <a:rPr lang="en-US" dirty="0"/>
-                <a:t>result</a:t>
-              </a:r>
-            </a:p>
-          </p:txBody>
-        </p:sp>
-        <p:sp>
-          <p:nvSpPr>
-            <p:cNvPr id="93" name="TextBox 92"/>
-            <p:cNvSpPr txBox="1"/>
-            <p:nvPr/>
-          </p:nvSpPr>
-          <p:spPr>
-            <a:xfrm>
-              <a:off x="6944110" y="1905793"/>
-              <a:ext cx="220343" cy="215444"/>
-            </a:xfrm>
-            <a:prstGeom prst="rect">
-              <a:avLst/>
-            </a:prstGeom>
-            <a:noFill/>
-          </p:spPr>
-          <p:txBody>
-            <a:bodyPr wrap="square" lIns="0" tIns="0" rIns="0" bIns="0" rtlCol="0">
-              <a:spAutoFit/>
-            </a:bodyPr>
-            <a:lstStyle>
-              <a:defPPr>
-                <a:defRPr lang="en-US"/>
-              </a:defPPr>
-              <a:lvl1pPr algn="r">
-                <a:defRPr sz="1400">
-                  <a:solidFill>
-                    <a:srgbClr val="0070C0"/>
-                  </a:solidFill>
-                </a:defRPr>
-              </a:lvl1pPr>
-            </a:lstStyle>
-            <a:p>
-              <a:r>
-                <a:rPr lang="en-US" dirty="0"/>
-                <a:t>s</a:t>
-              </a:r>
-            </a:p>
-          </p:txBody>
-        </p:sp>
-        <p:sp>
-          <p:nvSpPr>
-            <p:cNvPr id="40" name="Rectangle 62"/>
-            <p:cNvSpPr/>
-            <p:nvPr/>
-          </p:nvSpPr>
-          <p:spPr>
-            <a:xfrm>
-              <a:off x="11487131" y="1160853"/>
-              <a:ext cx="990979" cy="321481"/>
-            </a:xfrm>
-            <a:prstGeom prst="rect">
-              <a:avLst/>
-            </a:prstGeom>
-            <a:solidFill>
-              <a:srgbClr val="7030A0"/>
-            </a:solidFill>
-            <a:ln w="19050">
-              <a:solidFill>
-                <a:srgbClr val="7030A0"/>
-              </a:solidFill>
-            </a:ln>
-            <a:effectLst/>
-          </p:spPr>
-          <p:style>
-            <a:lnRef idx="1">
-              <a:schemeClr val="accent2"/>
-            </a:lnRef>
-            <a:fillRef idx="2">
-              <a:schemeClr val="accent2"/>
-            </a:fillRef>
-            <a:effectRef idx="1">
-              <a:schemeClr val="accent2"/>
-            </a:effectRef>
-            <a:fontRef idx="minor">
-              <a:schemeClr val="dk1"/>
-            </a:fontRef>
-          </p:style>
-          <p:txBody>
-            <a:bodyPr rtlCol="0" anchor="ctr"/>
-            <a:lstStyle/>
-            <a:p>
-              <a:pPr algn="ctr"/>
-              <a:r>
-                <a:rPr lang="en-US" sz="1600" dirty="0">
-                  <a:solidFill>
-                    <a:schemeClr val="bg1"/>
-                  </a:solidFill>
-                </a:rPr>
-                <a:t>:Model</a:t>
-              </a:r>
-              <a:endParaRPr lang="en-SG" sz="1600" dirty="0">
-                <a:solidFill>
-                  <a:schemeClr val="bg1"/>
-                </a:solidFill>
-              </a:endParaRPr>
-            </a:p>
-          </p:txBody>
-        </p:sp>
-        <p:cxnSp>
-          <p:nvCxnSpPr>
-            <p:cNvPr id="46" name="Straight Connector 45"/>
-            <p:cNvCxnSpPr>
-              <a:cxnSpLocks/>
-            </p:cNvCxnSpPr>
-            <p:nvPr/>
-          </p:nvCxnSpPr>
-          <p:spPr>
-            <a:xfrm flipH="1">
-              <a:off x="12011745" y="1491037"/>
-              <a:ext cx="11259" cy="2302243"/>
-            </a:xfrm>
-            <a:prstGeom prst="line">
-              <a:avLst/>
-            </a:prstGeom>
-            <a:ln w="19050">
-              <a:solidFill>
-                <a:srgbClr val="7030A0"/>
-              </a:solidFill>
-              <a:prstDash val="sysDash"/>
-            </a:ln>
-            <a:effectLst/>
-          </p:spPr>
-          <p:style>
-            <a:lnRef idx="1">
-              <a:schemeClr val="accent1"/>
-            </a:lnRef>
-            <a:fillRef idx="2">
-              <a:schemeClr val="accent1"/>
-            </a:fillRef>
-            <a:effectRef idx="1">
-              <a:schemeClr val="accent1"/>
-            </a:effectRef>
-            <a:fontRef idx="minor">
-              <a:schemeClr val="dk1"/>
-            </a:fontRef>
-          </p:style>
-        </p:cxnSp>
-        <p:sp>
-          <p:nvSpPr>
-            <p:cNvPr id="49" name="Rectangle 48"/>
-            <p:cNvSpPr/>
-            <p:nvPr/>
-          </p:nvSpPr>
-          <p:spPr>
-            <a:xfrm flipH="1">
-              <a:off x="10891857" y="3547894"/>
-              <a:ext cx="156033" cy="209927"/>
-            </a:xfrm>
-            <a:prstGeom prst="rect">
-              <a:avLst/>
-            </a:prstGeom>
-            <a:solidFill>
-              <a:srgbClr val="0070C0"/>
-            </a:solidFill>
-            <a:ln>
-              <a:solidFill>
-                <a:srgbClr val="0070C0"/>
-              </a:solidFill>
-            </a:ln>
-            <a:effectLst/>
-          </p:spPr>
-          <p:style>
-            <a:lnRef idx="1">
-              <a:schemeClr val="accent3"/>
-            </a:lnRef>
-            <a:fillRef idx="2">
-              <a:schemeClr val="accent3"/>
-            </a:fillRef>
-            <a:effectRef idx="1">
-              <a:schemeClr val="accent3"/>
-            </a:effectRef>
-            <a:fontRef idx="minor">
-              <a:schemeClr val="dk1"/>
-            </a:fontRef>
-          </p:style>
-          <p:txBody>
-            <a:bodyPr rtlCol="0" anchor="ctr"/>
-            <a:lstStyle/>
-            <a:p>
-              <a:pPr algn="ctr"/>
-              <a:endParaRPr lang="en-SG" sz="1400"/>
-            </a:p>
-          </p:txBody>
-        </p:sp>
-        <p:sp>
-          <p:nvSpPr>
-            <p:cNvPr id="19" name="Rectangle 62"/>
-            <p:cNvSpPr/>
-            <p:nvPr/>
-          </p:nvSpPr>
-          <p:spPr>
-            <a:xfrm>
-              <a:off x="9255290" y="1260268"/>
-              <a:ext cx="1093635" cy="461538"/>
-            </a:xfrm>
-            <a:prstGeom prst="rect">
-              <a:avLst/>
-            </a:prstGeom>
-            <a:solidFill>
-              <a:srgbClr val="0070C0"/>
-            </a:solidFill>
-            <a:ln w="19050">
-              <a:solidFill>
-                <a:srgbClr val="0070C0"/>
-              </a:solidFill>
-            </a:ln>
-            <a:effectLst/>
-          </p:spPr>
-          <p:style>
-            <a:lnRef idx="1">
-              <a:schemeClr val="accent2"/>
-            </a:lnRef>
-            <a:fillRef idx="2">
-              <a:schemeClr val="accent2"/>
-            </a:fillRef>
-            <a:effectRef idx="1">
-              <a:schemeClr val="accent2"/>
-            </a:effectRef>
-            <a:fontRef idx="minor">
-              <a:schemeClr val="dk1"/>
-            </a:fontRef>
-          </p:style>
-          <p:txBody>
-            <a:bodyPr rtlCol="0" anchor="ctr"/>
-            <a:lstStyle/>
-            <a:p>
-              <a:pPr algn="ctr"/>
-              <a:r>
-                <a:rPr lang="en-US" sz="1600" dirty="0">
-                  <a:solidFill>
-                    <a:schemeClr val="bg1"/>
-                  </a:solidFill>
-                </a:rPr>
-                <a:t>s:Sort</a:t>
-              </a:r>
-              <a:br>
-                <a:rPr lang="en-US" sz="1600" dirty="0">
-                  <a:solidFill>
-                    <a:schemeClr val="bg1"/>
-                  </a:solidFill>
-                </a:rPr>
-              </a:br>
-              <a:r>
-                <a:rPr lang="en-US" sz="1600" dirty="0">
-                  <a:solidFill>
-                    <a:schemeClr val="bg1"/>
-                  </a:solidFill>
-                </a:rPr>
-                <a:t>Command</a:t>
-              </a:r>
-              <a:endParaRPr lang="en-SG" sz="1600" dirty="0">
-                <a:solidFill>
-                  <a:schemeClr val="bg1"/>
-                </a:solidFill>
-              </a:endParaRPr>
-            </a:p>
-          </p:txBody>
-        </p:sp>
-        <p:cxnSp>
-          <p:nvCxnSpPr>
-            <p:cNvPr id="66" name="Straight Arrow Connector 65">
-              <a:extLst>
-                <a:ext uri="{FF2B5EF4-FFF2-40B4-BE49-F238E27FC236}">
-                  <a16:creationId xmlns:a16="http://schemas.microsoft.com/office/drawing/2014/main" id="{39916E2E-195A-4DC8-B025-B05FA87E6796}"/>
-                </a:ext>
-              </a:extLst>
-            </p:cNvPr>
-            <p:cNvCxnSpPr>
-              <a:cxnSpLocks/>
-            </p:cNvCxnSpPr>
-            <p:nvPr/>
-          </p:nvCxnSpPr>
-          <p:spPr>
-            <a:xfrm>
-              <a:off x="5910665" y="2731318"/>
-              <a:ext cx="3832164" cy="1"/>
-            </a:xfrm>
-            <a:prstGeom prst="straightConnector1">
-              <a:avLst/>
-            </a:prstGeom>
-            <a:ln w="19050">
-              <a:solidFill>
-                <a:srgbClr val="0070C0"/>
-              </a:solidFill>
-              <a:tailEnd type="arrow"/>
-            </a:ln>
-          </p:spPr>
-          <p:style>
-            <a:lnRef idx="1">
-              <a:schemeClr val="accent1"/>
-            </a:lnRef>
-            <a:fillRef idx="0">
-              <a:schemeClr val="accent1"/>
-            </a:fillRef>
-            <a:effectRef idx="0">
-              <a:schemeClr val="accent1"/>
-            </a:effectRef>
-            <a:fontRef idx="minor">
-              <a:schemeClr val="tx1"/>
-            </a:fontRef>
-          </p:style>
-        </p:cxnSp>
-        <p:cxnSp>
-          <p:nvCxnSpPr>
-            <p:cNvPr id="67" name="Straight Arrow Connector 66">
-              <a:extLst>
-                <a:ext uri="{FF2B5EF4-FFF2-40B4-BE49-F238E27FC236}">
-                  <a16:creationId xmlns:a16="http://schemas.microsoft.com/office/drawing/2014/main" id="{D881596E-177C-4FDC-8E60-CAB90B3D5FAB}"/>
-                </a:ext>
-              </a:extLst>
-            </p:cNvPr>
-            <p:cNvCxnSpPr>
-              <a:cxnSpLocks/>
-            </p:cNvCxnSpPr>
-            <p:nvPr/>
-          </p:nvCxnSpPr>
-          <p:spPr>
-            <a:xfrm>
-              <a:off x="5927563" y="1363922"/>
-              <a:ext cx="2256705" cy="1"/>
-            </a:xfrm>
-            <a:prstGeom prst="straightConnector1">
-              <a:avLst/>
-            </a:prstGeom>
-            <a:ln w="19050">
-              <a:solidFill>
-                <a:srgbClr val="0070C0"/>
-              </a:solidFill>
-              <a:tailEnd type="arrow"/>
-            </a:ln>
-          </p:spPr>
-          <p:style>
-            <a:lnRef idx="1">
-              <a:schemeClr val="accent1"/>
-            </a:lnRef>
-            <a:fillRef idx="0">
-              <a:schemeClr val="accent1"/>
-            </a:fillRef>
-            <a:effectRef idx="0">
-              <a:schemeClr val="accent1"/>
-            </a:effectRef>
-            <a:fontRef idx="minor">
-              <a:schemeClr val="tx1"/>
-            </a:fontRef>
-          </p:style>
-        </p:cxnSp>
-        <p:cxnSp>
-          <p:nvCxnSpPr>
-            <p:cNvPr id="69" name="Straight Arrow Connector 68">
-              <a:extLst>
-                <a:ext uri="{FF2B5EF4-FFF2-40B4-BE49-F238E27FC236}">
-                  <a16:creationId xmlns:a16="http://schemas.microsoft.com/office/drawing/2014/main" id="{7C9F21BC-13A9-471F-825A-2621FD36355F}"/>
-                </a:ext>
-              </a:extLst>
-            </p:cNvPr>
-            <p:cNvCxnSpPr>
-              <a:cxnSpLocks/>
-            </p:cNvCxnSpPr>
-            <p:nvPr/>
-          </p:nvCxnSpPr>
-          <p:spPr>
-            <a:xfrm>
-              <a:off x="5915311" y="3793280"/>
-              <a:ext cx="3831517" cy="0"/>
-            </a:xfrm>
-            <a:prstGeom prst="straightConnector1">
-              <a:avLst/>
-            </a:prstGeom>
-            <a:ln w="19050">
-              <a:solidFill>
-                <a:srgbClr val="0070C0"/>
-              </a:solidFill>
-              <a:prstDash val="sysDash"/>
-              <a:headEnd type="arrow" w="med" len="med"/>
-              <a:tailEnd type="none" w="med" len="med"/>
-            </a:ln>
-          </p:spPr>
-          <p:style>
-            <a:lnRef idx="1">
-              <a:schemeClr val="accent1"/>
-            </a:lnRef>
-            <a:fillRef idx="0">
-              <a:schemeClr val="accent1"/>
-            </a:fillRef>
-            <a:effectRef idx="0">
-              <a:schemeClr val="accent1"/>
-            </a:effectRef>
-            <a:fontRef idx="minor">
-              <a:schemeClr val="tx1"/>
-            </a:fontRef>
-          </p:style>
-        </p:cxnSp>
-        <p:cxnSp>
-          <p:nvCxnSpPr>
-            <p:cNvPr id="62" name="Straight Arrow Connector 65">
-              <a:extLst>
-                <a:ext uri="{FF2B5EF4-FFF2-40B4-BE49-F238E27FC236}">
-                  <a16:creationId xmlns:a16="http://schemas.microsoft.com/office/drawing/2014/main" id="{93520CF3-1155-4BC8-BA13-D0B7786EBF88}"/>
-                </a:ext>
-              </a:extLst>
-            </p:cNvPr>
-            <p:cNvCxnSpPr>
-              <a:cxnSpLocks/>
-            </p:cNvCxnSpPr>
-            <p:nvPr/>
-          </p:nvCxnSpPr>
-          <p:spPr>
-            <a:xfrm>
-              <a:off x="9817559" y="2731318"/>
-              <a:ext cx="2133600" cy="0"/>
-            </a:xfrm>
-            <a:prstGeom prst="straightConnector1">
-              <a:avLst/>
-            </a:prstGeom>
-            <a:ln w="19050">
-              <a:solidFill>
-                <a:srgbClr val="0070C0"/>
-              </a:solidFill>
-              <a:tailEnd type="arrow"/>
-            </a:ln>
-          </p:spPr>
-          <p:style>
-            <a:lnRef idx="1">
-              <a:schemeClr val="accent1"/>
-            </a:lnRef>
-            <a:fillRef idx="0">
-              <a:schemeClr val="accent1"/>
-            </a:fillRef>
-            <a:effectRef idx="0">
-              <a:schemeClr val="accent1"/>
-            </a:effectRef>
-            <a:fontRef idx="minor">
-              <a:schemeClr val="tx1"/>
-            </a:fontRef>
-          </p:style>
-        </p:cxnSp>
-        <p:cxnSp>
-          <p:nvCxnSpPr>
-            <p:cNvPr id="68" name="Straight Arrow Connector 68">
-              <a:extLst>
-                <a:ext uri="{FF2B5EF4-FFF2-40B4-BE49-F238E27FC236}">
-                  <a16:creationId xmlns:a16="http://schemas.microsoft.com/office/drawing/2014/main" id="{3781272C-6278-4383-A052-74FBF59B3CED}"/>
-                </a:ext>
-              </a:extLst>
-            </p:cNvPr>
-            <p:cNvCxnSpPr>
-              <a:cxnSpLocks/>
-            </p:cNvCxnSpPr>
-            <p:nvPr/>
-          </p:nvCxnSpPr>
-          <p:spPr>
-            <a:xfrm>
-              <a:off x="9899604" y="3763338"/>
-              <a:ext cx="984938" cy="0"/>
-            </a:xfrm>
-            <a:prstGeom prst="straightConnector1">
-              <a:avLst/>
-            </a:prstGeom>
-            <a:ln w="19050">
-              <a:solidFill>
-                <a:srgbClr val="0070C0"/>
-              </a:solidFill>
-              <a:prstDash val="sysDash"/>
-              <a:headEnd type="arrow" w="med" len="med"/>
-              <a:tailEnd type="none" w="med" len="med"/>
-            </a:ln>
-          </p:spPr>
-          <p:style>
-            <a:lnRef idx="1">
-              <a:schemeClr val="accent1"/>
-            </a:lnRef>
-            <a:fillRef idx="0">
-              <a:schemeClr val="accent1"/>
-            </a:fillRef>
-            <a:effectRef idx="0">
-              <a:schemeClr val="accent1"/>
-            </a:effectRef>
-            <a:fontRef idx="minor">
-              <a:schemeClr val="tx1"/>
-            </a:fontRef>
-          </p:style>
-        </p:cxnSp>
-        <p:sp>
-          <p:nvSpPr>
-            <p:cNvPr id="70" name="TextBox 81">
-              <a:extLst>
-                <a:ext uri="{FF2B5EF4-FFF2-40B4-BE49-F238E27FC236}">
-                  <a16:creationId xmlns:a16="http://schemas.microsoft.com/office/drawing/2014/main" id="{0617D983-0DA6-40B6-A4BC-8171EF9F0AD2}"/>
-                </a:ext>
-              </a:extLst>
-            </p:cNvPr>
-            <p:cNvSpPr txBox="1"/>
-            <p:nvPr/>
-          </p:nvSpPr>
-          <p:spPr>
-            <a:xfrm>
-              <a:off x="9386662" y="2475950"/>
-              <a:ext cx="1897847" cy="215444"/>
-            </a:xfrm>
-            <a:prstGeom prst="rect">
-              <a:avLst/>
-            </a:prstGeom>
-            <a:noFill/>
-          </p:spPr>
-          <p:txBody>
-            <a:bodyPr wrap="square" lIns="0" tIns="0" rIns="0" bIns="0" rtlCol="0">
-              <a:spAutoFit/>
-            </a:bodyPr>
-            <a:lstStyle>
-              <a:defPPr>
-                <a:defRPr lang="en-US"/>
-              </a:defPPr>
-              <a:lvl1pPr algn="r">
-                <a:defRPr sz="1400">
-                  <a:solidFill>
-                    <a:srgbClr val="0070C0"/>
-                  </a:solidFill>
-                </a:defRPr>
-              </a:lvl1pPr>
-            </a:lstStyle>
-            <a:p>
-              <a:r>
-                <a:rPr lang="en-US" dirty="0">
-                  <a:solidFill>
-                    <a:srgbClr val="7030A0"/>
-                  </a:solidFill>
-                </a:rPr>
-                <a:t>sortByName()</a:t>
-              </a:r>
-            </a:p>
-          </p:txBody>
-        </p:sp>
-        <p:sp>
-          <p:nvSpPr>
-            <p:cNvPr id="87" name="Rectangle 62">
-              <a:extLst>
-                <a:ext uri="{FF2B5EF4-FFF2-40B4-BE49-F238E27FC236}">
-                  <a16:creationId xmlns:a16="http://schemas.microsoft.com/office/drawing/2014/main" id="{C577E929-6255-40AE-9591-6D6C66E33E17}"/>
-                </a:ext>
-              </a:extLst>
-            </p:cNvPr>
-            <p:cNvSpPr/>
-            <p:nvPr/>
-          </p:nvSpPr>
-          <p:spPr>
-            <a:xfrm>
-              <a:off x="10050778" y="3100727"/>
-              <a:ext cx="1590430" cy="504759"/>
-            </a:xfrm>
-            <a:prstGeom prst="rect">
-              <a:avLst/>
-            </a:prstGeom>
-            <a:solidFill>
-              <a:srgbClr val="0070C0"/>
-            </a:solidFill>
-            <a:ln w="19050">
-              <a:solidFill>
-                <a:srgbClr val="0070C0"/>
-              </a:solidFill>
-            </a:ln>
-            <a:effectLst/>
-          </p:spPr>
-          <p:style>
-            <a:lnRef idx="1">
-              <a:schemeClr val="accent2"/>
-            </a:lnRef>
-            <a:fillRef idx="2">
-              <a:schemeClr val="accent2"/>
-            </a:fillRef>
-            <a:effectRef idx="1">
-              <a:schemeClr val="accent2"/>
-            </a:effectRef>
-            <a:fontRef idx="minor">
-              <a:schemeClr val="dk1"/>
-            </a:fontRef>
-          </p:style>
-          <p:txBody>
-            <a:bodyPr rtlCol="0" anchor="ctr"/>
-            <a:lstStyle/>
-            <a:p>
-              <a:pPr algn="ctr"/>
-              <a:r>
-                <a:rPr lang="en-US" sz="1600" dirty="0">
-                  <a:solidFill>
-                    <a:schemeClr val="bg1"/>
-                  </a:solidFill>
-                </a:rPr>
-                <a:t>result: CommandResult </a:t>
-              </a:r>
-              <a:endParaRPr lang="en-SG" sz="1600" dirty="0">
-                <a:solidFill>
-                  <a:schemeClr val="bg1"/>
-                </a:solidFill>
-              </a:endParaRPr>
-            </a:p>
-          </p:txBody>
-        </p:sp>
-        <p:sp>
-          <p:nvSpPr>
-            <p:cNvPr id="95" name="Rectangle 48">
-              <a:extLst>
-                <a:ext uri="{FF2B5EF4-FFF2-40B4-BE49-F238E27FC236}">
-                  <a16:creationId xmlns:a16="http://schemas.microsoft.com/office/drawing/2014/main" id="{C9DFEA62-1524-42F8-9A11-B3333DB9BAC2}"/>
-                </a:ext>
-              </a:extLst>
-            </p:cNvPr>
-            <p:cNvSpPr/>
-            <p:nvPr/>
-          </p:nvSpPr>
-          <p:spPr>
-            <a:xfrm>
-              <a:off x="11930855" y="2727724"/>
-              <a:ext cx="168896" cy="300179"/>
-            </a:xfrm>
-            <a:prstGeom prst="rect">
-              <a:avLst/>
-            </a:prstGeom>
-            <a:solidFill>
-              <a:srgbClr val="7030A0"/>
-            </a:solidFill>
-            <a:ln>
-              <a:solidFill>
-                <a:srgbClr val="7030A0"/>
-              </a:solidFill>
-            </a:ln>
-            <a:effectLst/>
-          </p:spPr>
-          <p:style>
-            <a:lnRef idx="1">
-              <a:schemeClr val="accent3"/>
-            </a:lnRef>
-            <a:fillRef idx="2">
-              <a:schemeClr val="accent3"/>
-            </a:fillRef>
-            <a:effectRef idx="1">
-              <a:schemeClr val="accent3"/>
-            </a:effectRef>
-            <a:fontRef idx="minor">
-              <a:schemeClr val="dk1"/>
-            </a:fontRef>
-          </p:style>
-          <p:txBody>
-            <a:bodyPr rtlCol="0" anchor="ctr"/>
-            <a:lstStyle/>
-            <a:p>
-              <a:pPr algn="ctr"/>
-              <a:endParaRPr lang="en-SG" sz="1400">
-                <a:solidFill>
-                  <a:srgbClr val="7030A0"/>
-                </a:solidFill>
-              </a:endParaRPr>
-            </a:p>
-          </p:txBody>
-        </p:sp>
-      </p:grpSp>
+            </a:endParaRPr>
+          </a:p>
+        </p:txBody>
+      </p:sp>
       <p:cxnSp>
         <p:nvCxnSpPr>
-          <p:cNvPr id="73" name="Straight Arrow Connector 72">
+          <p:cNvPr id="168" name="Straight Connector 167">
             <a:extLst>
               <a:ext uri="{FF2B5EF4-FFF2-40B4-BE49-F238E27FC236}">
-                <a16:creationId xmlns:a16="http://schemas.microsoft.com/office/drawing/2014/main" id="{7B597696-D1C8-458B-85ED-890A5E38EA94}"/>
+                <a16:creationId xmlns:a16="http://schemas.microsoft.com/office/drawing/2014/main" id="{37E26C3F-D0D5-4A97-AECC-C5351BFC2FA8}"/>
               </a:ext>
             </a:extLst>
           </p:cNvPr>
@@ -4910,16 +3774,215 @@
           <p:nvPr/>
         </p:nvCxnSpPr>
         <p:spPr>
-          <a:xfrm flipV="1">
-            <a:off x="8518538" y="5136243"/>
-            <a:ext cx="271666" cy="1"/>
-          </a:xfrm>
-          <a:prstGeom prst="straightConnector1">
+          <a:xfrm>
+            <a:off x="11448788" y="5054980"/>
+            <a:ext cx="12603" cy="2431231"/>
+          </a:xfrm>
+          <a:prstGeom prst="line">
             <a:avLst/>
           </a:prstGeom>
           <a:ln w="19050">
             <a:solidFill>
-              <a:srgbClr val="0070C0"/>
+              <a:srgbClr val="7030A0"/>
+            </a:solidFill>
+            <a:prstDash val="sysDash"/>
+          </a:ln>
+          <a:effectLst/>
+        </p:spPr>
+        <p:style>
+          <a:lnRef idx="1">
+            <a:schemeClr val="accent1"/>
+          </a:lnRef>
+          <a:fillRef idx="2">
+            <a:schemeClr val="accent1"/>
+          </a:fillRef>
+          <a:effectRef idx="1">
+            <a:schemeClr val="accent1"/>
+          </a:effectRef>
+          <a:fontRef idx="minor">
+            <a:schemeClr val="dk1"/>
+          </a:fontRef>
+        </p:style>
+      </p:cxnSp>
+      <p:sp>
+        <p:nvSpPr>
+          <p:cNvPr id="169" name="Rectangle 168">
+            <a:extLst>
+              <a:ext uri="{FF2B5EF4-FFF2-40B4-BE49-F238E27FC236}">
+                <a16:creationId xmlns:a16="http://schemas.microsoft.com/office/drawing/2014/main" id="{BB3A64BB-6288-4D9B-B62D-C3346D82C347}"/>
+              </a:ext>
+            </a:extLst>
+          </p:cNvPr>
+          <p:cNvSpPr/>
+          <p:nvPr/>
+        </p:nvSpPr>
+        <p:spPr>
+          <a:xfrm>
+            <a:off x="11350066" y="5573402"/>
+            <a:ext cx="214995" cy="1292213"/>
+          </a:xfrm>
+          <a:prstGeom prst="rect">
+            <a:avLst/>
+          </a:prstGeom>
+          <a:solidFill>
+            <a:srgbClr val="7030A0"/>
+          </a:solidFill>
+          <a:ln>
+            <a:solidFill>
+              <a:srgbClr val="7030A0"/>
+            </a:solidFill>
+          </a:ln>
+          <a:effectLst/>
+        </p:spPr>
+        <p:style>
+          <a:lnRef idx="1">
+            <a:schemeClr val="accent3"/>
+          </a:lnRef>
+          <a:fillRef idx="2">
+            <a:schemeClr val="accent3"/>
+          </a:fillRef>
+          <a:effectRef idx="1">
+            <a:schemeClr val="accent3"/>
+          </a:effectRef>
+          <a:fontRef idx="minor">
+            <a:schemeClr val="dk1"/>
+          </a:fontRef>
+        </p:style>
+        <p:txBody>
+          <a:bodyPr rtlCol="0" anchor="ctr"/>
+          <a:lstStyle/>
+          <a:p>
+            <a:pPr algn="ctr"/>
+            <a:endParaRPr lang="en-SG" sz="1400"/>
+          </a:p>
+        </p:txBody>
+      </p:sp>
+      <p:cxnSp>
+        <p:nvCxnSpPr>
+          <p:cNvPr id="170" name="Straight Connector 169">
+            <a:extLst>
+              <a:ext uri="{FF2B5EF4-FFF2-40B4-BE49-F238E27FC236}">
+                <a16:creationId xmlns:a16="http://schemas.microsoft.com/office/drawing/2014/main" id="{27F0EF15-BA28-4B0B-BCC2-F63C541B24FB}"/>
+              </a:ext>
+            </a:extLst>
+          </p:cNvPr>
+          <p:cNvCxnSpPr>
+            <a:cxnSpLocks/>
+          </p:cNvCxnSpPr>
+          <p:nvPr/>
+        </p:nvCxnSpPr>
+        <p:spPr>
+          <a:xfrm flipH="1">
+            <a:off x="13287341" y="4868399"/>
+            <a:ext cx="19396" cy="2561856"/>
+          </a:xfrm>
+          <a:prstGeom prst="line">
+            <a:avLst/>
+          </a:prstGeom>
+          <a:ln w="19050">
+            <a:solidFill>
+              <a:srgbClr val="7030A0"/>
+            </a:solidFill>
+            <a:prstDash val="sysDash"/>
+          </a:ln>
+          <a:effectLst/>
+        </p:spPr>
+        <p:style>
+          <a:lnRef idx="1">
+            <a:schemeClr val="accent1"/>
+          </a:lnRef>
+          <a:fillRef idx="2">
+            <a:schemeClr val="accent1"/>
+          </a:fillRef>
+          <a:effectRef idx="1">
+            <a:schemeClr val="accent1"/>
+          </a:effectRef>
+          <a:fontRef idx="minor">
+            <a:schemeClr val="dk1"/>
+          </a:fontRef>
+        </p:style>
+      </p:cxnSp>
+      <p:sp>
+        <p:nvSpPr>
+          <p:cNvPr id="171" name="TextBox 170">
+            <a:extLst>
+              <a:ext uri="{FF2B5EF4-FFF2-40B4-BE49-F238E27FC236}">
+                <a16:creationId xmlns:a16="http://schemas.microsoft.com/office/drawing/2014/main" id="{C0D77FF0-4151-4B5E-B779-50C11937AEA8}"/>
+              </a:ext>
+            </a:extLst>
+          </p:cNvPr>
+          <p:cNvSpPr txBox="1"/>
+          <p:nvPr/>
+        </p:nvSpPr>
+        <p:spPr>
+          <a:xfrm>
+            <a:off x="11613678" y="5545872"/>
+            <a:ext cx="1617088" cy="369332"/>
+          </a:xfrm>
+          <a:prstGeom prst="rect">
+            <a:avLst/>
+          </a:prstGeom>
+          <a:noFill/>
+          <a:ln>
+            <a:noFill/>
+          </a:ln>
+        </p:spPr>
+        <p:txBody>
+          <a:bodyPr wrap="square" lIns="0" tIns="0" rIns="0" bIns="0" rtlCol="0">
+            <a:spAutoFit/>
+          </a:bodyPr>
+          <a:lstStyle>
+            <a:defPPr>
+              <a:defRPr lang="en-US"/>
+            </a:defPPr>
+            <a:lvl1pPr algn="r">
+              <a:defRPr sz="1400">
+                <a:solidFill>
+                  <a:srgbClr val="0070C0"/>
+                </a:solidFill>
+              </a:defRPr>
+            </a:lvl1pPr>
+          </a:lstStyle>
+          <a:p>
+            <a:pPr algn="ctr"/>
+            <a:r>
+              <a:rPr lang="en-US" sz="1200" dirty="0">
+                <a:solidFill>
+                  <a:schemeClr val="accent4">
+                    <a:lumMod val="75000"/>
+                  </a:schemeClr>
+                </a:solidFill>
+              </a:rPr>
+              <a:t>sortFilteredEquipmentList(comparator)</a:t>
+            </a:r>
+          </a:p>
+        </p:txBody>
+      </p:sp>
+      <p:cxnSp>
+        <p:nvCxnSpPr>
+          <p:cNvPr id="172" name="Straight Arrow Connector 171">
+            <a:extLst>
+              <a:ext uri="{FF2B5EF4-FFF2-40B4-BE49-F238E27FC236}">
+                <a16:creationId xmlns:a16="http://schemas.microsoft.com/office/drawing/2014/main" id="{4470E61F-6DA1-4B9D-A41E-7D36932C147D}"/>
+              </a:ext>
+            </a:extLst>
+          </p:cNvPr>
+          <p:cNvCxnSpPr>
+            <a:cxnSpLocks/>
+          </p:cNvCxnSpPr>
+          <p:nvPr/>
+        </p:nvCxnSpPr>
+        <p:spPr>
+          <a:xfrm>
+            <a:off x="11499377" y="5745320"/>
+            <a:ext cx="1698818" cy="0"/>
+          </a:xfrm>
+          <a:prstGeom prst="straightConnector1">
+            <a:avLst/>
+          </a:prstGeom>
+          <a:ln w="19050">
+            <a:solidFill>
+              <a:srgbClr val="7030A0"/>
             </a:solidFill>
             <a:tailEnd type="arrow"/>
           </a:ln>
@@ -4941,10 +4004,10 @@
       </p:cxnSp>
       <p:cxnSp>
         <p:nvCxnSpPr>
-          <p:cNvPr id="76" name="Straight Arrow Connector 75">
+          <p:cNvPr id="173" name="Straight Arrow Connector 172">
             <a:extLst>
               <a:ext uri="{FF2B5EF4-FFF2-40B4-BE49-F238E27FC236}">
-                <a16:creationId xmlns:a16="http://schemas.microsoft.com/office/drawing/2014/main" id="{FEFDF589-E299-4B09-8412-370E02017DA7}"/>
+                <a16:creationId xmlns:a16="http://schemas.microsoft.com/office/drawing/2014/main" id="{99217210-5DAC-44A4-BB34-6B63C7BBC58F}"/>
               </a:ext>
             </a:extLst>
           </p:cNvPr>
@@ -4955,8 +4018,8 @@
         </p:nvCxnSpPr>
         <p:spPr>
           <a:xfrm>
-            <a:off x="8608520" y="4848038"/>
-            <a:ext cx="2140018" cy="0"/>
+            <a:off x="11555890" y="6714323"/>
+            <a:ext cx="1719387" cy="1"/>
           </a:xfrm>
           <a:prstGeom prst="straightConnector1">
             <a:avLst/>
@@ -4987,10 +4050,10 @@
       </p:cxnSp>
       <p:cxnSp>
         <p:nvCxnSpPr>
-          <p:cNvPr id="89" name="Straight Arrow Connector 88">
+          <p:cNvPr id="176" name="Straight Connector 175">
             <a:extLst>
               <a:ext uri="{FF2B5EF4-FFF2-40B4-BE49-F238E27FC236}">
-                <a16:creationId xmlns:a16="http://schemas.microsoft.com/office/drawing/2014/main" id="{8C9BCC68-B276-4AE3-8218-F154D1EFACCA}"/>
+                <a16:creationId xmlns:a16="http://schemas.microsoft.com/office/drawing/2014/main" id="{067E4077-7002-47E6-954C-7C0FF4301DEA}"/>
               </a:ext>
             </a:extLst>
           </p:cNvPr>
@@ -5000,16 +4063,183 @@
           <p:nvPr/>
         </p:nvCxnSpPr>
         <p:spPr>
-          <a:xfrm>
-            <a:off x="3009106" y="3168059"/>
-            <a:ext cx="1474707" cy="3684"/>
-          </a:xfrm>
-          <a:prstGeom prst="straightConnector1">
+          <a:xfrm flipH="1">
+            <a:off x="14445411" y="5416950"/>
+            <a:ext cx="21862" cy="1905583"/>
+          </a:xfrm>
+          <a:prstGeom prst="line">
             <a:avLst/>
           </a:prstGeom>
           <a:ln w="19050">
             <a:solidFill>
-              <a:srgbClr val="00B050"/>
+              <a:srgbClr val="7030A0"/>
+            </a:solidFill>
+            <a:prstDash val="sysDash"/>
+          </a:ln>
+          <a:effectLst/>
+        </p:spPr>
+        <p:style>
+          <a:lnRef idx="1">
+            <a:schemeClr val="accent1"/>
+          </a:lnRef>
+          <a:fillRef idx="2">
+            <a:schemeClr val="accent1"/>
+          </a:fillRef>
+          <a:effectRef idx="1">
+            <a:schemeClr val="accent1"/>
+          </a:effectRef>
+          <a:fontRef idx="minor">
+            <a:schemeClr val="dk1"/>
+          </a:fontRef>
+        </p:style>
+      </p:cxnSp>
+      <p:sp>
+        <p:nvSpPr>
+          <p:cNvPr id="175" name="Rectangle 174">
+            <a:extLst>
+              <a:ext uri="{FF2B5EF4-FFF2-40B4-BE49-F238E27FC236}">
+                <a16:creationId xmlns:a16="http://schemas.microsoft.com/office/drawing/2014/main" id="{08657389-9B91-499C-8C79-7302669ADBE3}"/>
+              </a:ext>
+            </a:extLst>
+          </p:cNvPr>
+          <p:cNvSpPr/>
+          <p:nvPr/>
+        </p:nvSpPr>
+        <p:spPr>
+          <a:xfrm>
+            <a:off x="14396153" y="5851551"/>
+            <a:ext cx="142838" cy="584435"/>
+          </a:xfrm>
+          <a:prstGeom prst="rect">
+            <a:avLst/>
+          </a:prstGeom>
+          <a:solidFill>
+            <a:srgbClr val="7030A0"/>
+          </a:solidFill>
+          <a:ln>
+            <a:solidFill>
+              <a:srgbClr val="7030A0"/>
+            </a:solidFill>
+          </a:ln>
+          <a:effectLst/>
+        </p:spPr>
+        <p:style>
+          <a:lnRef idx="1">
+            <a:schemeClr val="accent3"/>
+          </a:lnRef>
+          <a:fillRef idx="2">
+            <a:schemeClr val="accent3"/>
+          </a:fillRef>
+          <a:effectRef idx="1">
+            <a:schemeClr val="accent3"/>
+          </a:effectRef>
+          <a:fontRef idx="minor">
+            <a:schemeClr val="dk1"/>
+          </a:fontRef>
+        </p:style>
+        <p:txBody>
+          <a:bodyPr rtlCol="0" anchor="ctr"/>
+          <a:lstStyle/>
+          <a:p>
+            <a:pPr algn="ctr"/>
+            <a:endParaRPr lang="en-SG" sz="1400"/>
+          </a:p>
+        </p:txBody>
+      </p:sp>
+      <p:sp>
+        <p:nvSpPr>
+          <p:cNvPr id="177" name="TextBox 176">
+            <a:extLst>
+              <a:ext uri="{FF2B5EF4-FFF2-40B4-BE49-F238E27FC236}">
+                <a16:creationId xmlns:a16="http://schemas.microsoft.com/office/drawing/2014/main" id="{79B2634E-8822-49A7-B5BE-DA58309C53B3}"/>
+              </a:ext>
+            </a:extLst>
+          </p:cNvPr>
+          <p:cNvSpPr txBox="1"/>
+          <p:nvPr/>
+        </p:nvSpPr>
+        <p:spPr>
+          <a:xfrm>
+            <a:off x="13423012" y="5638205"/>
+            <a:ext cx="951280" cy="553998"/>
+          </a:xfrm>
+          <a:prstGeom prst="rect">
+            <a:avLst/>
+          </a:prstGeom>
+          <a:noFill/>
+          <a:ln>
+            <a:noFill/>
+          </a:ln>
+        </p:spPr>
+        <p:txBody>
+          <a:bodyPr wrap="square" lIns="0" tIns="0" rIns="0" bIns="0" rtlCol="0">
+            <a:spAutoFit/>
+          </a:bodyPr>
+          <a:lstStyle>
+            <a:defPPr>
+              <a:defRPr lang="en-US"/>
+            </a:defPPr>
+            <a:lvl1pPr algn="r">
+              <a:defRPr sz="1400">
+                <a:solidFill>
+                  <a:srgbClr val="0070C0"/>
+                </a:solidFill>
+              </a:defRPr>
+            </a:lvl1pPr>
+          </a:lstStyle>
+          <a:p>
+            <a:pPr algn="ctr"/>
+            <a:r>
+              <a:rPr lang="en-US" sz="1200" dirty="0">
+                <a:solidFill>
+                  <a:schemeClr val="accent4">
+                    <a:lumMod val="75000"/>
+                  </a:schemeClr>
+                </a:solidFill>
+              </a:rPr>
+              <a:t>sortEquipmentList</a:t>
+            </a:r>
+          </a:p>
+          <a:p>
+            <a:pPr algn="ctr"/>
+            <a:r>
+              <a:rPr lang="en-US" sz="1200" dirty="0">
+                <a:solidFill>
+                  <a:schemeClr val="accent4">
+                    <a:lumMod val="75000"/>
+                  </a:schemeClr>
+                </a:solidFill>
+              </a:rPr>
+              <a:t>(comparator)</a:t>
+            </a:r>
+          </a:p>
+        </p:txBody>
+      </p:sp>
+      <p:cxnSp>
+        <p:nvCxnSpPr>
+          <p:cNvPr id="178" name="Straight Arrow Connector 177">
+            <a:extLst>
+              <a:ext uri="{FF2B5EF4-FFF2-40B4-BE49-F238E27FC236}">
+                <a16:creationId xmlns:a16="http://schemas.microsoft.com/office/drawing/2014/main" id="{CA258481-E636-4A38-B865-115BD4A6C470}"/>
+              </a:ext>
+            </a:extLst>
+          </p:cNvPr>
+          <p:cNvCxnSpPr>
+            <a:cxnSpLocks/>
+          </p:cNvCxnSpPr>
+          <p:nvPr/>
+        </p:nvCxnSpPr>
+        <p:spPr>
+          <a:xfrm>
+            <a:off x="13372306" y="5851552"/>
+            <a:ext cx="1073105" cy="0"/>
+          </a:xfrm>
+          <a:prstGeom prst="straightConnector1">
+            <a:avLst/>
+          </a:prstGeom>
+          <a:ln w="19050">
+            <a:solidFill>
+              <a:srgbClr val="7030A0"/>
             </a:solidFill>
             <a:tailEnd type="arrow"/>
           </a:ln>
@@ -5031,10 +4261,10 @@
       </p:cxnSp>
       <p:cxnSp>
         <p:nvCxnSpPr>
-          <p:cNvPr id="102" name="Straight Connector 101">
+          <p:cNvPr id="179" name="Straight Arrow Connector 178">
             <a:extLst>
               <a:ext uri="{FF2B5EF4-FFF2-40B4-BE49-F238E27FC236}">
-                <a16:creationId xmlns:a16="http://schemas.microsoft.com/office/drawing/2014/main" id="{33288492-80DB-45CD-8CF6-8F1265A891E1}"/>
+                <a16:creationId xmlns:a16="http://schemas.microsoft.com/office/drawing/2014/main" id="{810BC143-DA8B-4646-B663-1032E4F9F8E4}"/>
               </a:ext>
             </a:extLst>
           </p:cNvPr>
@@ -5044,9 +4274,55 @@
           <p:nvPr/>
         </p:nvCxnSpPr>
         <p:spPr>
-          <a:xfrm>
-            <a:off x="4555821" y="2817365"/>
-            <a:ext cx="0" cy="3052795"/>
+          <a:xfrm flipV="1">
+            <a:off x="13371880" y="6436014"/>
+            <a:ext cx="1057836" cy="1"/>
+          </a:xfrm>
+          <a:prstGeom prst="straightConnector1">
+            <a:avLst/>
+          </a:prstGeom>
+          <a:ln w="19050">
+            <a:solidFill>
+              <a:srgbClr val="7030A0"/>
+            </a:solidFill>
+            <a:prstDash val="sysDash"/>
+            <a:headEnd type="arrow" w="med" len="med"/>
+            <a:tailEnd type="none" w="med" len="med"/>
+          </a:ln>
+        </p:spPr>
+        <p:style>
+          <a:lnRef idx="1">
+            <a:schemeClr val="accent1"/>
+          </a:lnRef>
+          <a:fillRef idx="0">
+            <a:schemeClr val="accent1"/>
+          </a:fillRef>
+          <a:effectRef idx="0">
+            <a:schemeClr val="accent1"/>
+          </a:effectRef>
+          <a:fontRef idx="minor">
+            <a:schemeClr val="tx1"/>
+          </a:fontRef>
+        </p:style>
+      </p:cxnSp>
+      <p:cxnSp>
+        <p:nvCxnSpPr>
+          <p:cNvPr id="111" name="Straight Connector 110">
+            <a:extLst>
+              <a:ext uri="{FF2B5EF4-FFF2-40B4-BE49-F238E27FC236}">
+                <a16:creationId xmlns:a16="http://schemas.microsoft.com/office/drawing/2014/main" id="{C38350B5-D4E1-4B9F-AE4C-48B34ECF7B16}"/>
+              </a:ext>
+            </a:extLst>
+          </p:cNvPr>
+          <p:cNvCxnSpPr>
+            <a:cxnSpLocks/>
+          </p:cNvCxnSpPr>
+          <p:nvPr/>
+        </p:nvCxnSpPr>
+        <p:spPr>
+          <a:xfrm>
+            <a:off x="9023612" y="4100010"/>
+            <a:ext cx="0" cy="3661882"/>
           </a:xfrm>
           <a:prstGeom prst="line">
             <a:avLst/>
@@ -5074,6 +4350,2560 @@
           </a:fontRef>
         </p:style>
       </p:cxnSp>
+      <p:cxnSp>
+        <p:nvCxnSpPr>
+          <p:cNvPr id="112" name="Straight Connector 111">
+            <a:extLst>
+              <a:ext uri="{FF2B5EF4-FFF2-40B4-BE49-F238E27FC236}">
+                <a16:creationId xmlns:a16="http://schemas.microsoft.com/office/drawing/2014/main" id="{E8EEBAC6-29D1-433B-8E1C-A5E1F4184A64}"/>
+              </a:ext>
+            </a:extLst>
+          </p:cNvPr>
+          <p:cNvCxnSpPr>
+            <a:cxnSpLocks/>
+          </p:cNvCxnSpPr>
+          <p:nvPr/>
+        </p:nvCxnSpPr>
+        <p:spPr>
+          <a:xfrm flipH="1">
+            <a:off x="7223471" y="3491254"/>
+            <a:ext cx="19289" cy="4221980"/>
+          </a:xfrm>
+          <a:prstGeom prst="line">
+            <a:avLst/>
+          </a:prstGeom>
+          <a:ln w="19050">
+            <a:solidFill>
+              <a:srgbClr val="0070C0"/>
+            </a:solidFill>
+            <a:prstDash val="sysDash"/>
+          </a:ln>
+          <a:effectLst/>
+        </p:spPr>
+        <p:style>
+          <a:lnRef idx="1">
+            <a:schemeClr val="accent1"/>
+          </a:lnRef>
+          <a:fillRef idx="2">
+            <a:schemeClr val="accent1"/>
+          </a:fillRef>
+          <a:effectRef idx="1">
+            <a:schemeClr val="accent1"/>
+          </a:effectRef>
+          <a:fontRef idx="minor">
+            <a:schemeClr val="dk1"/>
+          </a:fontRef>
+        </p:style>
+      </p:cxnSp>
+      <p:sp>
+        <p:nvSpPr>
+          <p:cNvPr id="113" name="Rectangle 62">
+            <a:extLst>
+              <a:ext uri="{FF2B5EF4-FFF2-40B4-BE49-F238E27FC236}">
+                <a16:creationId xmlns:a16="http://schemas.microsoft.com/office/drawing/2014/main" id="{AE1A6EFC-8768-415A-B1FC-2737FA54ABD8}"/>
+              </a:ext>
+            </a:extLst>
+          </p:cNvPr>
+          <p:cNvSpPr/>
+          <p:nvPr/>
+        </p:nvSpPr>
+        <p:spPr>
+          <a:xfrm>
+            <a:off x="946083" y="2434156"/>
+            <a:ext cx="1455629" cy="346760"/>
+          </a:xfrm>
+          <a:prstGeom prst="rect">
+            <a:avLst/>
+          </a:prstGeom>
+          <a:solidFill>
+            <a:srgbClr val="0070C0"/>
+          </a:solidFill>
+          <a:ln w="19050">
+            <a:solidFill>
+              <a:srgbClr val="0070C0"/>
+            </a:solidFill>
+          </a:ln>
+          <a:effectLst/>
+        </p:spPr>
+        <p:style>
+          <a:lnRef idx="1">
+            <a:schemeClr val="accent2"/>
+          </a:lnRef>
+          <a:fillRef idx="2">
+            <a:schemeClr val="accent2"/>
+          </a:fillRef>
+          <a:effectRef idx="1">
+            <a:schemeClr val="accent2"/>
+          </a:effectRef>
+          <a:fontRef idx="minor">
+            <a:schemeClr val="dk1"/>
+          </a:fontRef>
+        </p:style>
+        <p:txBody>
+          <a:bodyPr rtlCol="0" anchor="ctr"/>
+          <a:lstStyle/>
+          <a:p>
+            <a:pPr algn="ctr"/>
+            <a:r>
+              <a:rPr lang="en-US" sz="1600">
+                <a:solidFill>
+                  <a:schemeClr val="bg1"/>
+                </a:solidFill>
+              </a:rPr>
+              <a:t>:LogicManager</a:t>
+            </a:r>
+            <a:endParaRPr lang="en-SG" sz="1600" dirty="0">
+              <a:solidFill>
+                <a:schemeClr val="bg1"/>
+              </a:solidFill>
+            </a:endParaRPr>
+          </a:p>
+        </p:txBody>
+      </p:sp>
+      <p:cxnSp>
+        <p:nvCxnSpPr>
+          <p:cNvPr id="114" name="Straight Connector 113">
+            <a:extLst>
+              <a:ext uri="{FF2B5EF4-FFF2-40B4-BE49-F238E27FC236}">
+                <a16:creationId xmlns:a16="http://schemas.microsoft.com/office/drawing/2014/main" id="{6FBB1E07-A304-493A-AD99-C6D7F93C8C78}"/>
+              </a:ext>
+            </a:extLst>
+          </p:cNvPr>
+          <p:cNvCxnSpPr>
+            <a:cxnSpLocks/>
+          </p:cNvCxnSpPr>
+          <p:nvPr/>
+        </p:nvCxnSpPr>
+        <p:spPr>
+          <a:xfrm>
+            <a:off x="1673897" y="2848627"/>
+            <a:ext cx="0" cy="5001770"/>
+          </a:xfrm>
+          <a:prstGeom prst="line">
+            <a:avLst/>
+          </a:prstGeom>
+          <a:ln w="19050">
+            <a:solidFill>
+              <a:srgbClr val="0070C0"/>
+            </a:solidFill>
+            <a:prstDash val="sysDash"/>
+          </a:ln>
+          <a:effectLst/>
+        </p:spPr>
+        <p:style>
+          <a:lnRef idx="1">
+            <a:schemeClr val="accent1"/>
+          </a:lnRef>
+          <a:fillRef idx="2">
+            <a:schemeClr val="accent1"/>
+          </a:fillRef>
+          <a:effectRef idx="1">
+            <a:schemeClr val="accent1"/>
+          </a:effectRef>
+          <a:fontRef idx="minor">
+            <a:schemeClr val="dk1"/>
+          </a:fontRef>
+        </p:style>
+      </p:cxnSp>
+      <p:sp>
+        <p:nvSpPr>
+          <p:cNvPr id="115" name="Rectangle 114">
+            <a:extLst>
+              <a:ext uri="{FF2B5EF4-FFF2-40B4-BE49-F238E27FC236}">
+                <a16:creationId xmlns:a16="http://schemas.microsoft.com/office/drawing/2014/main" id="{45882EB2-0A8E-4FE4-AADA-A3F3B9DE65A4}"/>
+              </a:ext>
+            </a:extLst>
+          </p:cNvPr>
+          <p:cNvSpPr/>
+          <p:nvPr/>
+        </p:nvSpPr>
+        <p:spPr>
+          <a:xfrm>
+            <a:off x="1564380" y="3148521"/>
+            <a:ext cx="189909" cy="4337690"/>
+          </a:xfrm>
+          <a:prstGeom prst="rect">
+            <a:avLst/>
+          </a:prstGeom>
+          <a:solidFill>
+            <a:srgbClr val="0070C0"/>
+          </a:solidFill>
+          <a:ln>
+            <a:solidFill>
+              <a:srgbClr val="0070C0"/>
+            </a:solidFill>
+          </a:ln>
+          <a:effectLst/>
+        </p:spPr>
+        <p:style>
+          <a:lnRef idx="1">
+            <a:schemeClr val="accent3"/>
+          </a:lnRef>
+          <a:fillRef idx="2">
+            <a:schemeClr val="accent3"/>
+          </a:fillRef>
+          <a:effectRef idx="1">
+            <a:schemeClr val="accent3"/>
+          </a:effectRef>
+          <a:fontRef idx="minor">
+            <a:schemeClr val="dk1"/>
+          </a:fontRef>
+        </p:style>
+        <p:txBody>
+          <a:bodyPr rtlCol="0" anchor="ctr"/>
+          <a:lstStyle/>
+          <a:p>
+            <a:pPr algn="ctr"/>
+            <a:endParaRPr lang="en-SG" sz="1400"/>
+          </a:p>
+        </p:txBody>
+      </p:sp>
+      <p:sp>
+        <p:nvSpPr>
+          <p:cNvPr id="116" name="Rectangle 62">
+            <a:extLst>
+              <a:ext uri="{FF2B5EF4-FFF2-40B4-BE49-F238E27FC236}">
+                <a16:creationId xmlns:a16="http://schemas.microsoft.com/office/drawing/2014/main" id="{236B71C0-0954-40AE-B634-CDC4B5B1FB7A}"/>
+              </a:ext>
+            </a:extLst>
+          </p:cNvPr>
+          <p:cNvSpPr/>
+          <p:nvPr/>
+        </p:nvSpPr>
+        <p:spPr>
+          <a:xfrm>
+            <a:off x="2898161" y="2336926"/>
+            <a:ext cx="1965378" cy="440853"/>
+          </a:xfrm>
+          <a:prstGeom prst="rect">
+            <a:avLst/>
+          </a:prstGeom>
+          <a:solidFill>
+            <a:srgbClr val="0070C0"/>
+          </a:solidFill>
+          <a:ln w="19050">
+            <a:solidFill>
+              <a:srgbClr val="0070C0"/>
+            </a:solidFill>
+          </a:ln>
+          <a:effectLst/>
+        </p:spPr>
+        <p:style>
+          <a:lnRef idx="1">
+            <a:schemeClr val="accent2"/>
+          </a:lnRef>
+          <a:fillRef idx="2">
+            <a:schemeClr val="accent2"/>
+          </a:fillRef>
+          <a:effectRef idx="1">
+            <a:schemeClr val="accent2"/>
+          </a:effectRef>
+          <a:fontRef idx="minor">
+            <a:schemeClr val="dk1"/>
+          </a:fontRef>
+        </p:style>
+        <p:txBody>
+          <a:bodyPr rtlCol="0" anchor="ctr"/>
+          <a:lstStyle/>
+          <a:p>
+            <a:pPr algn="ctr"/>
+            <a:r>
+              <a:rPr lang="en-US" sz="1600" dirty="0">
+                <a:solidFill>
+                  <a:schemeClr val="bg1"/>
+                </a:solidFill>
+              </a:rPr>
+              <a:t>:EquipmentManagerParser</a:t>
+            </a:r>
+            <a:endParaRPr lang="en-SG" sz="1600" dirty="0">
+              <a:solidFill>
+                <a:schemeClr val="bg1"/>
+              </a:solidFill>
+            </a:endParaRPr>
+          </a:p>
+        </p:txBody>
+      </p:sp>
+      <p:cxnSp>
+        <p:nvCxnSpPr>
+          <p:cNvPr id="117" name="Straight Connector 116">
+            <a:extLst>
+              <a:ext uri="{FF2B5EF4-FFF2-40B4-BE49-F238E27FC236}">
+                <a16:creationId xmlns:a16="http://schemas.microsoft.com/office/drawing/2014/main" id="{611AC65F-7514-49F3-A853-C6967D663386}"/>
+              </a:ext>
+            </a:extLst>
+          </p:cNvPr>
+          <p:cNvCxnSpPr>
+            <a:cxnSpLocks/>
+          </p:cNvCxnSpPr>
+          <p:nvPr/>
+        </p:nvCxnSpPr>
+        <p:spPr>
+          <a:xfrm>
+            <a:off x="4113525" y="2797827"/>
+            <a:ext cx="0" cy="4915407"/>
+          </a:xfrm>
+          <a:prstGeom prst="line">
+            <a:avLst/>
+          </a:prstGeom>
+          <a:ln w="19050">
+            <a:solidFill>
+              <a:srgbClr val="0070C0"/>
+            </a:solidFill>
+            <a:prstDash val="sysDash"/>
+          </a:ln>
+          <a:effectLst/>
+        </p:spPr>
+        <p:style>
+          <a:lnRef idx="1">
+            <a:schemeClr val="accent1"/>
+          </a:lnRef>
+          <a:fillRef idx="2">
+            <a:schemeClr val="accent1"/>
+          </a:fillRef>
+          <a:effectRef idx="1">
+            <a:schemeClr val="accent1"/>
+          </a:effectRef>
+          <a:fontRef idx="minor">
+            <a:schemeClr val="dk1"/>
+          </a:fontRef>
+        </p:style>
+      </p:cxnSp>
+      <p:sp>
+        <p:nvSpPr>
+          <p:cNvPr id="118" name="Rectangle 117">
+            <a:extLst>
+              <a:ext uri="{FF2B5EF4-FFF2-40B4-BE49-F238E27FC236}">
+                <a16:creationId xmlns:a16="http://schemas.microsoft.com/office/drawing/2014/main" id="{03E9EB8D-2587-4423-83FD-23C0AD7314D1}"/>
+              </a:ext>
+            </a:extLst>
+          </p:cNvPr>
+          <p:cNvSpPr/>
+          <p:nvPr/>
+        </p:nvSpPr>
+        <p:spPr>
+          <a:xfrm>
+            <a:off x="4041518" y="3256019"/>
+            <a:ext cx="152400" cy="1830937"/>
+          </a:xfrm>
+          <a:prstGeom prst="rect">
+            <a:avLst/>
+          </a:prstGeom>
+          <a:solidFill>
+            <a:srgbClr val="0070C0"/>
+          </a:solidFill>
+          <a:ln>
+            <a:solidFill>
+              <a:srgbClr val="0070C0"/>
+            </a:solidFill>
+          </a:ln>
+          <a:effectLst/>
+        </p:spPr>
+        <p:style>
+          <a:lnRef idx="1">
+            <a:schemeClr val="accent3"/>
+          </a:lnRef>
+          <a:fillRef idx="2">
+            <a:schemeClr val="accent3"/>
+          </a:fillRef>
+          <a:effectRef idx="1">
+            <a:schemeClr val="accent3"/>
+          </a:effectRef>
+          <a:fontRef idx="minor">
+            <a:schemeClr val="dk1"/>
+          </a:fontRef>
+        </p:style>
+        <p:txBody>
+          <a:bodyPr rtlCol="0" anchor="ctr"/>
+          <a:lstStyle/>
+          <a:p>
+            <a:pPr algn="ctr"/>
+            <a:endParaRPr lang="en-SG" sz="1400">
+              <a:solidFill>
+                <a:schemeClr val="dk1"/>
+              </a:solidFill>
+            </a:endParaRPr>
+          </a:p>
+        </p:txBody>
+      </p:sp>
+      <p:cxnSp>
+        <p:nvCxnSpPr>
+          <p:cNvPr id="119" name="Straight Connector 118">
+            <a:extLst>
+              <a:ext uri="{FF2B5EF4-FFF2-40B4-BE49-F238E27FC236}">
+                <a16:creationId xmlns:a16="http://schemas.microsoft.com/office/drawing/2014/main" id="{3F3294B3-845F-41B6-9613-268E1057FF35}"/>
+              </a:ext>
+            </a:extLst>
+          </p:cNvPr>
+          <p:cNvCxnSpPr>
+            <a:cxnSpLocks/>
+            <a:stCxn id="120" idx="0"/>
+            <a:endCxn id="130" idx="0"/>
+          </p:cNvCxnSpPr>
+          <p:nvPr/>
+        </p:nvCxnSpPr>
+        <p:spPr>
+          <a:xfrm flipH="1">
+            <a:off x="5635002" y="3366807"/>
+            <a:ext cx="19289" cy="4221980"/>
+          </a:xfrm>
+          <a:prstGeom prst="line">
+            <a:avLst/>
+          </a:prstGeom>
+          <a:ln w="19050">
+            <a:solidFill>
+              <a:srgbClr val="0070C0"/>
+            </a:solidFill>
+            <a:prstDash val="sysDash"/>
+          </a:ln>
+          <a:effectLst/>
+        </p:spPr>
+        <p:style>
+          <a:lnRef idx="1">
+            <a:schemeClr val="accent1"/>
+          </a:lnRef>
+          <a:fillRef idx="2">
+            <a:schemeClr val="accent1"/>
+          </a:fillRef>
+          <a:effectRef idx="1">
+            <a:schemeClr val="accent1"/>
+          </a:effectRef>
+          <a:fontRef idx="minor">
+            <a:schemeClr val="dk1"/>
+          </a:fontRef>
+        </p:style>
+      </p:cxnSp>
+      <p:sp>
+        <p:nvSpPr>
+          <p:cNvPr id="120" name="Rectangle 119">
+            <a:extLst>
+              <a:ext uri="{FF2B5EF4-FFF2-40B4-BE49-F238E27FC236}">
+                <a16:creationId xmlns:a16="http://schemas.microsoft.com/office/drawing/2014/main" id="{BE210D80-B787-41C0-910F-0BB17A9129A9}"/>
+              </a:ext>
+            </a:extLst>
+          </p:cNvPr>
+          <p:cNvSpPr/>
+          <p:nvPr/>
+        </p:nvSpPr>
+        <p:spPr>
+          <a:xfrm>
+            <a:off x="5588820" y="3366807"/>
+            <a:ext cx="152400" cy="276003"/>
+          </a:xfrm>
+          <a:prstGeom prst="rect">
+            <a:avLst/>
+          </a:prstGeom>
+          <a:solidFill>
+            <a:srgbClr val="0070C0"/>
+          </a:solidFill>
+          <a:ln>
+            <a:solidFill>
+              <a:srgbClr val="0070C0"/>
+            </a:solidFill>
+          </a:ln>
+          <a:effectLst/>
+        </p:spPr>
+        <p:style>
+          <a:lnRef idx="1">
+            <a:schemeClr val="accent3"/>
+          </a:lnRef>
+          <a:fillRef idx="2">
+            <a:schemeClr val="accent3"/>
+          </a:fillRef>
+          <a:effectRef idx="1">
+            <a:schemeClr val="accent3"/>
+          </a:effectRef>
+          <a:fontRef idx="minor">
+            <a:schemeClr val="dk1"/>
+          </a:fontRef>
+        </p:style>
+        <p:txBody>
+          <a:bodyPr rtlCol="0" anchor="ctr"/>
+          <a:lstStyle/>
+          <a:p>
+            <a:pPr algn="ctr"/>
+            <a:endParaRPr lang="en-SG" sz="1400"/>
+          </a:p>
+        </p:txBody>
+      </p:sp>
+      <p:cxnSp>
+        <p:nvCxnSpPr>
+          <p:cNvPr id="121" name="Straight Arrow Connector 120">
+            <a:extLst>
+              <a:ext uri="{FF2B5EF4-FFF2-40B4-BE49-F238E27FC236}">
+                <a16:creationId xmlns:a16="http://schemas.microsoft.com/office/drawing/2014/main" id="{7378A622-7E67-4874-8D55-E178F20264DC}"/>
+              </a:ext>
+            </a:extLst>
+          </p:cNvPr>
+          <p:cNvCxnSpPr>
+            <a:cxnSpLocks/>
+          </p:cNvCxnSpPr>
+          <p:nvPr/>
+        </p:nvCxnSpPr>
+        <p:spPr>
+          <a:xfrm>
+            <a:off x="482038" y="3152209"/>
+            <a:ext cx="1119851" cy="0"/>
+          </a:xfrm>
+          <a:prstGeom prst="straightConnector1">
+            <a:avLst/>
+          </a:prstGeom>
+          <a:ln w="19050">
+            <a:solidFill>
+              <a:srgbClr val="00B050"/>
+            </a:solidFill>
+            <a:tailEnd type="arrow"/>
+          </a:ln>
+        </p:spPr>
+        <p:style>
+          <a:lnRef idx="1">
+            <a:schemeClr val="accent1"/>
+          </a:lnRef>
+          <a:fillRef idx="0">
+            <a:schemeClr val="accent1"/>
+          </a:fillRef>
+          <a:effectRef idx="0">
+            <a:schemeClr val="accent1"/>
+          </a:effectRef>
+          <a:fontRef idx="minor">
+            <a:schemeClr val="tx1"/>
+          </a:fontRef>
+        </p:style>
+      </p:cxnSp>
+      <p:sp>
+        <p:nvSpPr>
+          <p:cNvPr id="122" name="TextBox 121">
+            <a:extLst>
+              <a:ext uri="{FF2B5EF4-FFF2-40B4-BE49-F238E27FC236}">
+                <a16:creationId xmlns:a16="http://schemas.microsoft.com/office/drawing/2014/main" id="{A0245781-3433-4704-9CA3-A07D8F541BB8}"/>
+              </a:ext>
+            </a:extLst>
+          </p:cNvPr>
+          <p:cNvSpPr txBox="1"/>
+          <p:nvPr/>
+        </p:nvSpPr>
+        <p:spPr>
+          <a:xfrm>
+            <a:off x="234488" y="2933076"/>
+            <a:ext cx="1424846" cy="430887"/>
+          </a:xfrm>
+          <a:prstGeom prst="rect">
+            <a:avLst/>
+          </a:prstGeom>
+          <a:noFill/>
+        </p:spPr>
+        <p:txBody>
+          <a:bodyPr wrap="square" lIns="0" tIns="0" rIns="0" bIns="0" rtlCol="0">
+            <a:spAutoFit/>
+          </a:bodyPr>
+          <a:lstStyle/>
+          <a:p>
+            <a:pPr algn="ctr"/>
+            <a:r>
+              <a:rPr lang="en-US" sz="1400" dirty="0">
+                <a:solidFill>
+                  <a:srgbClr val="0070C0"/>
+                </a:solidFill>
+              </a:rPr>
+              <a:t>execute</a:t>
+            </a:r>
+          </a:p>
+          <a:p>
+            <a:pPr algn="ctr"/>
+            <a:r>
+              <a:rPr lang="en-US" sz="1400" dirty="0">
+                <a:solidFill>
+                  <a:srgbClr val="0070C0"/>
+                </a:solidFill>
+              </a:rPr>
+              <a:t>(“sort name”)</a:t>
+            </a:r>
+          </a:p>
+        </p:txBody>
+      </p:sp>
+      <p:cxnSp>
+        <p:nvCxnSpPr>
+          <p:cNvPr id="123" name="Straight Arrow Connector 122">
+            <a:extLst>
+              <a:ext uri="{FF2B5EF4-FFF2-40B4-BE49-F238E27FC236}">
+                <a16:creationId xmlns:a16="http://schemas.microsoft.com/office/drawing/2014/main" id="{34BCFC12-DC3E-4BB5-8536-74082219699A}"/>
+              </a:ext>
+            </a:extLst>
+          </p:cNvPr>
+          <p:cNvCxnSpPr>
+            <a:cxnSpLocks/>
+          </p:cNvCxnSpPr>
+          <p:nvPr/>
+        </p:nvCxnSpPr>
+        <p:spPr>
+          <a:xfrm flipV="1">
+            <a:off x="4198910" y="3286734"/>
+            <a:ext cx="922392" cy="1"/>
+          </a:xfrm>
+          <a:prstGeom prst="straightConnector1">
+            <a:avLst/>
+          </a:prstGeom>
+          <a:ln w="19050">
+            <a:solidFill>
+              <a:srgbClr val="0070C0"/>
+            </a:solidFill>
+            <a:tailEnd type="arrow"/>
+          </a:ln>
+        </p:spPr>
+        <p:style>
+          <a:lnRef idx="1">
+            <a:schemeClr val="accent1"/>
+          </a:lnRef>
+          <a:fillRef idx="0">
+            <a:schemeClr val="accent1"/>
+          </a:fillRef>
+          <a:effectRef idx="0">
+            <a:schemeClr val="accent1"/>
+          </a:effectRef>
+          <a:fontRef idx="minor">
+            <a:schemeClr val="tx1"/>
+          </a:fontRef>
+        </p:style>
+      </p:cxnSp>
+      <p:sp>
+        <p:nvSpPr>
+          <p:cNvPr id="124" name="TextBox 123">
+            <a:extLst>
+              <a:ext uri="{FF2B5EF4-FFF2-40B4-BE49-F238E27FC236}">
+                <a16:creationId xmlns:a16="http://schemas.microsoft.com/office/drawing/2014/main" id="{B2E81FA1-9A09-424A-8EA5-91E36944B339}"/>
+              </a:ext>
+            </a:extLst>
+          </p:cNvPr>
+          <p:cNvSpPr txBox="1"/>
+          <p:nvPr/>
+        </p:nvSpPr>
+        <p:spPr>
+          <a:xfrm>
+            <a:off x="2521829" y="5256166"/>
+            <a:ext cx="855809" cy="215444"/>
+          </a:xfrm>
+          <a:prstGeom prst="rect">
+            <a:avLst/>
+          </a:prstGeom>
+          <a:noFill/>
+        </p:spPr>
+        <p:txBody>
+          <a:bodyPr wrap="square" lIns="0" tIns="0" rIns="0" bIns="0" rtlCol="0">
+            <a:spAutoFit/>
+          </a:bodyPr>
+          <a:lstStyle>
+            <a:defPPr>
+              <a:defRPr lang="en-US"/>
+            </a:defPPr>
+            <a:lvl1pPr algn="r">
+              <a:defRPr sz="1400">
+                <a:solidFill>
+                  <a:srgbClr val="0070C0"/>
+                </a:solidFill>
+              </a:defRPr>
+            </a:lvl1pPr>
+          </a:lstStyle>
+          <a:p>
+            <a:r>
+              <a:rPr lang="en-US"/>
+              <a:t>execute()</a:t>
+            </a:r>
+            <a:endParaRPr lang="en-US" dirty="0"/>
+          </a:p>
+        </p:txBody>
+      </p:sp>
+      <p:cxnSp>
+        <p:nvCxnSpPr>
+          <p:cNvPr id="125" name="Straight Arrow Connector 124">
+            <a:extLst>
+              <a:ext uri="{FF2B5EF4-FFF2-40B4-BE49-F238E27FC236}">
+                <a16:creationId xmlns:a16="http://schemas.microsoft.com/office/drawing/2014/main" id="{A539C548-F6C7-4F94-9611-AE41B637E497}"/>
+              </a:ext>
+            </a:extLst>
+          </p:cNvPr>
+          <p:cNvCxnSpPr>
+            <a:cxnSpLocks/>
+          </p:cNvCxnSpPr>
+          <p:nvPr/>
+        </p:nvCxnSpPr>
+        <p:spPr>
+          <a:xfrm>
+            <a:off x="4172046" y="3652626"/>
+            <a:ext cx="1492974" cy="0"/>
+          </a:xfrm>
+          <a:prstGeom prst="straightConnector1">
+            <a:avLst/>
+          </a:prstGeom>
+          <a:ln w="19050">
+            <a:solidFill>
+              <a:srgbClr val="0070C0"/>
+            </a:solidFill>
+            <a:prstDash val="sysDash"/>
+            <a:headEnd type="arrow" w="med" len="med"/>
+            <a:tailEnd type="none" w="med" len="med"/>
+          </a:ln>
+        </p:spPr>
+        <p:style>
+          <a:lnRef idx="1">
+            <a:schemeClr val="accent1"/>
+          </a:lnRef>
+          <a:fillRef idx="0">
+            <a:schemeClr val="accent1"/>
+          </a:fillRef>
+          <a:effectRef idx="0">
+            <a:schemeClr val="accent1"/>
+          </a:effectRef>
+          <a:fontRef idx="minor">
+            <a:schemeClr val="tx1"/>
+          </a:fontRef>
+        </p:style>
+      </p:cxnSp>
+      <p:cxnSp>
+        <p:nvCxnSpPr>
+          <p:cNvPr id="126" name="Straight Arrow Connector 125">
+            <a:extLst>
+              <a:ext uri="{FF2B5EF4-FFF2-40B4-BE49-F238E27FC236}">
+                <a16:creationId xmlns:a16="http://schemas.microsoft.com/office/drawing/2014/main" id="{A83E0316-2398-43C8-98EF-D9C7CBCFCACB}"/>
+              </a:ext>
+            </a:extLst>
+          </p:cNvPr>
+          <p:cNvCxnSpPr>
+            <a:cxnSpLocks/>
+          </p:cNvCxnSpPr>
+          <p:nvPr/>
+        </p:nvCxnSpPr>
+        <p:spPr>
+          <a:xfrm>
+            <a:off x="1754289" y="5089817"/>
+            <a:ext cx="2348067" cy="0"/>
+          </a:xfrm>
+          <a:prstGeom prst="straightConnector1">
+            <a:avLst/>
+          </a:prstGeom>
+          <a:ln w="19050">
+            <a:solidFill>
+              <a:srgbClr val="0070C0"/>
+            </a:solidFill>
+            <a:prstDash val="sysDash"/>
+            <a:headEnd type="arrow" w="med" len="med"/>
+            <a:tailEnd type="none" w="med" len="med"/>
+          </a:ln>
+        </p:spPr>
+        <p:style>
+          <a:lnRef idx="1">
+            <a:schemeClr val="accent1"/>
+          </a:lnRef>
+          <a:fillRef idx="0">
+            <a:schemeClr val="accent1"/>
+          </a:fillRef>
+          <a:effectRef idx="0">
+            <a:schemeClr val="accent1"/>
+          </a:effectRef>
+          <a:fontRef idx="minor">
+            <a:schemeClr val="tx1"/>
+          </a:fontRef>
+        </p:style>
+      </p:cxnSp>
+      <p:cxnSp>
+        <p:nvCxnSpPr>
+          <p:cNvPr id="127" name="Straight Arrow Connector 126">
+            <a:extLst>
+              <a:ext uri="{FF2B5EF4-FFF2-40B4-BE49-F238E27FC236}">
+                <a16:creationId xmlns:a16="http://schemas.microsoft.com/office/drawing/2014/main" id="{D7E6F688-B52C-474B-BAE4-48C0470966BE}"/>
+              </a:ext>
+            </a:extLst>
+          </p:cNvPr>
+          <p:cNvCxnSpPr>
+            <a:cxnSpLocks/>
+          </p:cNvCxnSpPr>
+          <p:nvPr/>
+        </p:nvCxnSpPr>
+        <p:spPr>
+          <a:xfrm>
+            <a:off x="477846" y="7486211"/>
+            <a:ext cx="1196051" cy="0"/>
+          </a:xfrm>
+          <a:prstGeom prst="straightConnector1">
+            <a:avLst/>
+          </a:prstGeom>
+          <a:ln w="19050">
+            <a:solidFill>
+              <a:schemeClr val="accent1"/>
+            </a:solidFill>
+            <a:prstDash val="sysDash"/>
+            <a:headEnd type="arrow" w="med" len="med"/>
+            <a:tailEnd type="none" w="med" len="med"/>
+          </a:ln>
+        </p:spPr>
+        <p:style>
+          <a:lnRef idx="1">
+            <a:schemeClr val="accent1"/>
+          </a:lnRef>
+          <a:fillRef idx="0">
+            <a:schemeClr val="accent1"/>
+          </a:fillRef>
+          <a:effectRef idx="0">
+            <a:schemeClr val="accent1"/>
+          </a:effectRef>
+          <a:fontRef idx="minor">
+            <a:schemeClr val="tx1"/>
+          </a:fontRef>
+        </p:style>
+      </p:cxnSp>
+      <p:sp>
+        <p:nvSpPr>
+          <p:cNvPr id="128" name="TextBox 127">
+            <a:extLst>
+              <a:ext uri="{FF2B5EF4-FFF2-40B4-BE49-F238E27FC236}">
+                <a16:creationId xmlns:a16="http://schemas.microsoft.com/office/drawing/2014/main" id="{489FA409-DB88-48AB-BC17-1F28FDBD7779}"/>
+              </a:ext>
+            </a:extLst>
+          </p:cNvPr>
+          <p:cNvSpPr txBox="1"/>
+          <p:nvPr/>
+        </p:nvSpPr>
+        <p:spPr>
+          <a:xfrm>
+            <a:off x="1929838" y="3016882"/>
+            <a:ext cx="1979855" cy="430887"/>
+          </a:xfrm>
+          <a:prstGeom prst="rect">
+            <a:avLst/>
+          </a:prstGeom>
+          <a:noFill/>
+        </p:spPr>
+        <p:txBody>
+          <a:bodyPr wrap="square" lIns="0" tIns="0" rIns="0" bIns="0" rtlCol="0">
+            <a:spAutoFit/>
+          </a:bodyPr>
+          <a:lstStyle>
+            <a:defPPr>
+              <a:defRPr lang="en-US"/>
+            </a:defPPr>
+            <a:lvl1pPr algn="r">
+              <a:defRPr sz="1400">
+                <a:solidFill>
+                  <a:srgbClr val="0070C0"/>
+                </a:solidFill>
+              </a:defRPr>
+            </a:lvl1pPr>
+          </a:lstStyle>
+          <a:p>
+            <a:pPr algn="ctr"/>
+            <a:r>
+              <a:rPr lang="en-US" dirty="0"/>
+              <a:t>parseCommand</a:t>
+            </a:r>
+          </a:p>
+          <a:p>
+            <a:pPr algn="ctr"/>
+            <a:r>
+              <a:rPr lang="en-US" dirty="0"/>
+              <a:t>(“sort name”)</a:t>
+            </a:r>
+          </a:p>
+        </p:txBody>
+      </p:sp>
+      <p:sp>
+        <p:nvSpPr>
+          <p:cNvPr id="129" name="TextBox 128">
+            <a:extLst>
+              <a:ext uri="{FF2B5EF4-FFF2-40B4-BE49-F238E27FC236}">
+                <a16:creationId xmlns:a16="http://schemas.microsoft.com/office/drawing/2014/main" id="{796143C5-B661-446D-B57A-F97A87974204}"/>
+              </a:ext>
+            </a:extLst>
+          </p:cNvPr>
+          <p:cNvSpPr txBox="1"/>
+          <p:nvPr/>
+        </p:nvSpPr>
+        <p:spPr>
+          <a:xfrm>
+            <a:off x="530939" y="7214811"/>
+            <a:ext cx="762000" cy="215444"/>
+          </a:xfrm>
+          <a:prstGeom prst="rect">
+            <a:avLst/>
+          </a:prstGeom>
+          <a:noFill/>
+        </p:spPr>
+        <p:txBody>
+          <a:bodyPr wrap="square" lIns="0" tIns="0" rIns="0" bIns="0" rtlCol="0">
+            <a:spAutoFit/>
+          </a:bodyPr>
+          <a:lstStyle>
+            <a:defPPr>
+              <a:defRPr lang="en-US"/>
+            </a:defPPr>
+            <a:lvl1pPr algn="r">
+              <a:defRPr sz="1400">
+                <a:solidFill>
+                  <a:srgbClr val="0070C0"/>
+                </a:solidFill>
+              </a:defRPr>
+            </a:lvl1pPr>
+          </a:lstStyle>
+          <a:p>
+            <a:r>
+              <a:rPr lang="en-US"/>
+              <a:t>result</a:t>
+            </a:r>
+            <a:endParaRPr lang="en-US" dirty="0"/>
+          </a:p>
+        </p:txBody>
+      </p:sp>
+      <p:sp>
+        <p:nvSpPr>
+          <p:cNvPr id="130" name="TextBox 129">
+            <a:extLst>
+              <a:ext uri="{FF2B5EF4-FFF2-40B4-BE49-F238E27FC236}">
+                <a16:creationId xmlns:a16="http://schemas.microsoft.com/office/drawing/2014/main" id="{2E0DF0A8-BB40-4FB2-A8BB-91BC8E850CF8}"/>
+              </a:ext>
+            </a:extLst>
+          </p:cNvPr>
+          <p:cNvSpPr txBox="1"/>
+          <p:nvPr/>
+        </p:nvSpPr>
+        <p:spPr>
+          <a:xfrm>
+            <a:off x="5516529" y="7588787"/>
+            <a:ext cx="258404" cy="261610"/>
+          </a:xfrm>
+          <a:prstGeom prst="rect">
+            <a:avLst/>
+          </a:prstGeom>
+          <a:noFill/>
+        </p:spPr>
+        <p:txBody>
+          <a:bodyPr wrap="square" rtlCol="0">
+            <a:spAutoFit/>
+          </a:bodyPr>
+          <a:lstStyle/>
+          <a:p>
+            <a:r>
+              <a:rPr lang="en-SG" sz="1100" dirty="0">
+                <a:solidFill>
+                  <a:srgbClr val="002060"/>
+                </a:solidFill>
+              </a:rPr>
+              <a:t>X</a:t>
+            </a:r>
+          </a:p>
+        </p:txBody>
+      </p:sp>
+      <p:sp>
+        <p:nvSpPr>
+          <p:cNvPr id="131" name="Rectangle 62">
+            <a:extLst>
+              <a:ext uri="{FF2B5EF4-FFF2-40B4-BE49-F238E27FC236}">
+                <a16:creationId xmlns:a16="http://schemas.microsoft.com/office/drawing/2014/main" id="{2A703788-A5A1-4F71-AA40-2BEC467385AF}"/>
+              </a:ext>
+            </a:extLst>
+          </p:cNvPr>
+          <p:cNvSpPr/>
+          <p:nvPr/>
+        </p:nvSpPr>
+        <p:spPr>
+          <a:xfrm>
+            <a:off x="5098914" y="2728410"/>
+            <a:ext cx="1429251" cy="767790"/>
+          </a:xfrm>
+          <a:prstGeom prst="rect">
+            <a:avLst/>
+          </a:prstGeom>
+          <a:solidFill>
+            <a:srgbClr val="0070C0"/>
+          </a:solidFill>
+          <a:ln w="19050">
+            <a:solidFill>
+              <a:srgbClr val="0070C0"/>
+            </a:solidFill>
+          </a:ln>
+          <a:effectLst/>
+        </p:spPr>
+        <p:style>
+          <a:lnRef idx="1">
+            <a:schemeClr val="accent2"/>
+          </a:lnRef>
+          <a:fillRef idx="2">
+            <a:schemeClr val="accent2"/>
+          </a:fillRef>
+          <a:effectRef idx="1">
+            <a:schemeClr val="accent2"/>
+          </a:effectRef>
+          <a:fontRef idx="minor">
+            <a:schemeClr val="dk1"/>
+          </a:fontRef>
+        </p:style>
+        <p:txBody>
+          <a:bodyPr rtlCol="0" anchor="ctr"/>
+          <a:lstStyle/>
+          <a:p>
+            <a:pPr algn="ctr"/>
+            <a:r>
+              <a:rPr lang="en-US" sz="1600">
+                <a:solidFill>
+                  <a:schemeClr val="bg1"/>
+                </a:solidFill>
+              </a:rPr>
+              <a:t>:SortCommandParser</a:t>
+            </a:r>
+            <a:endParaRPr lang="en-SG" sz="1600" dirty="0">
+              <a:solidFill>
+                <a:schemeClr val="bg1"/>
+              </a:solidFill>
+            </a:endParaRPr>
+          </a:p>
+        </p:txBody>
+      </p:sp>
+      <p:cxnSp>
+        <p:nvCxnSpPr>
+          <p:cNvPr id="132" name="Straight Arrow Connector 131">
+            <a:extLst>
+              <a:ext uri="{FF2B5EF4-FFF2-40B4-BE49-F238E27FC236}">
+                <a16:creationId xmlns:a16="http://schemas.microsoft.com/office/drawing/2014/main" id="{34676C90-A34F-44E1-A430-904AA69148FC}"/>
+              </a:ext>
+            </a:extLst>
+          </p:cNvPr>
+          <p:cNvCxnSpPr>
+            <a:cxnSpLocks/>
+          </p:cNvCxnSpPr>
+          <p:nvPr/>
+        </p:nvCxnSpPr>
+        <p:spPr>
+          <a:xfrm>
+            <a:off x="1762102" y="5500871"/>
+            <a:ext cx="7153191" cy="0"/>
+          </a:xfrm>
+          <a:prstGeom prst="straightConnector1">
+            <a:avLst/>
+          </a:prstGeom>
+          <a:ln w="19050">
+            <a:solidFill>
+              <a:srgbClr val="0070C0"/>
+            </a:solidFill>
+            <a:tailEnd type="arrow"/>
+          </a:ln>
+        </p:spPr>
+        <p:style>
+          <a:lnRef idx="1">
+            <a:schemeClr val="accent1"/>
+          </a:lnRef>
+          <a:fillRef idx="0">
+            <a:schemeClr val="accent1"/>
+          </a:fillRef>
+          <a:effectRef idx="0">
+            <a:schemeClr val="accent1"/>
+          </a:effectRef>
+          <a:fontRef idx="minor">
+            <a:schemeClr val="tx1"/>
+          </a:fontRef>
+        </p:style>
+      </p:cxnSp>
+      <p:cxnSp>
+        <p:nvCxnSpPr>
+          <p:cNvPr id="133" name="Straight Arrow Connector 132">
+            <a:extLst>
+              <a:ext uri="{FF2B5EF4-FFF2-40B4-BE49-F238E27FC236}">
+                <a16:creationId xmlns:a16="http://schemas.microsoft.com/office/drawing/2014/main" id="{96D10046-13DF-471B-95B6-E1C725CD8749}"/>
+              </a:ext>
+            </a:extLst>
+          </p:cNvPr>
+          <p:cNvCxnSpPr>
+            <a:cxnSpLocks/>
+          </p:cNvCxnSpPr>
+          <p:nvPr/>
+        </p:nvCxnSpPr>
+        <p:spPr>
+          <a:xfrm>
+            <a:off x="1771183" y="3254128"/>
+            <a:ext cx="2256705" cy="1"/>
+          </a:xfrm>
+          <a:prstGeom prst="straightConnector1">
+            <a:avLst/>
+          </a:prstGeom>
+          <a:ln w="19050">
+            <a:solidFill>
+              <a:srgbClr val="0070C0"/>
+            </a:solidFill>
+            <a:tailEnd type="arrow"/>
+          </a:ln>
+        </p:spPr>
+        <p:style>
+          <a:lnRef idx="1">
+            <a:schemeClr val="accent1"/>
+          </a:lnRef>
+          <a:fillRef idx="0">
+            <a:schemeClr val="accent1"/>
+          </a:fillRef>
+          <a:effectRef idx="0">
+            <a:schemeClr val="accent1"/>
+          </a:effectRef>
+          <a:fontRef idx="minor">
+            <a:schemeClr val="tx1"/>
+          </a:fontRef>
+        </p:style>
+      </p:cxnSp>
+      <p:cxnSp>
+        <p:nvCxnSpPr>
+          <p:cNvPr id="134" name="Straight Arrow Connector 133">
+            <a:extLst>
+              <a:ext uri="{FF2B5EF4-FFF2-40B4-BE49-F238E27FC236}">
+                <a16:creationId xmlns:a16="http://schemas.microsoft.com/office/drawing/2014/main" id="{3E5D5000-0DAB-4FB1-AEAB-A9A095C8FD39}"/>
+              </a:ext>
+            </a:extLst>
+          </p:cNvPr>
+          <p:cNvCxnSpPr>
+            <a:cxnSpLocks/>
+          </p:cNvCxnSpPr>
+          <p:nvPr/>
+        </p:nvCxnSpPr>
+        <p:spPr>
+          <a:xfrm>
+            <a:off x="1726010" y="7148539"/>
+            <a:ext cx="7189283" cy="0"/>
+          </a:xfrm>
+          <a:prstGeom prst="straightConnector1">
+            <a:avLst/>
+          </a:prstGeom>
+          <a:ln w="19050">
+            <a:solidFill>
+              <a:srgbClr val="0070C0"/>
+            </a:solidFill>
+            <a:prstDash val="sysDash"/>
+            <a:headEnd type="arrow" w="med" len="med"/>
+            <a:tailEnd type="none" w="med" len="med"/>
+          </a:ln>
+        </p:spPr>
+        <p:style>
+          <a:lnRef idx="1">
+            <a:schemeClr val="accent1"/>
+          </a:lnRef>
+          <a:fillRef idx="0">
+            <a:schemeClr val="accent1"/>
+          </a:fillRef>
+          <a:effectRef idx="0">
+            <a:schemeClr val="accent1"/>
+          </a:effectRef>
+          <a:fontRef idx="minor">
+            <a:schemeClr val="tx1"/>
+          </a:fontRef>
+        </p:style>
+      </p:cxnSp>
+      <p:sp>
+        <p:nvSpPr>
+          <p:cNvPr id="136" name="Rectangle 135">
+            <a:extLst>
+              <a:ext uri="{FF2B5EF4-FFF2-40B4-BE49-F238E27FC236}">
+                <a16:creationId xmlns:a16="http://schemas.microsoft.com/office/drawing/2014/main" id="{79E4CDAC-580D-46E8-87E3-241F122BEE6E}"/>
+              </a:ext>
+            </a:extLst>
+          </p:cNvPr>
+          <p:cNvSpPr/>
+          <p:nvPr/>
+        </p:nvSpPr>
+        <p:spPr>
+          <a:xfrm>
+            <a:off x="9943306" y="6833883"/>
+            <a:ext cx="158126" cy="181997"/>
+          </a:xfrm>
+          <a:prstGeom prst="rect">
+            <a:avLst/>
+          </a:prstGeom>
+          <a:solidFill>
+            <a:srgbClr val="0070C0"/>
+          </a:solidFill>
+          <a:ln>
+            <a:solidFill>
+              <a:srgbClr val="0070C0"/>
+            </a:solidFill>
+          </a:ln>
+          <a:effectLst/>
+        </p:spPr>
+        <p:style>
+          <a:lnRef idx="1">
+            <a:schemeClr val="accent3"/>
+          </a:lnRef>
+          <a:fillRef idx="2">
+            <a:schemeClr val="accent3"/>
+          </a:fillRef>
+          <a:effectRef idx="1">
+            <a:schemeClr val="accent3"/>
+          </a:effectRef>
+          <a:fontRef idx="minor">
+            <a:schemeClr val="dk1"/>
+          </a:fontRef>
+        </p:style>
+        <p:txBody>
+          <a:bodyPr rtlCol="0" anchor="ctr"/>
+          <a:lstStyle/>
+          <a:p>
+            <a:pPr algn="ctr"/>
+            <a:endParaRPr lang="en-SG" sz="1400"/>
+          </a:p>
+        </p:txBody>
+      </p:sp>
+      <p:cxnSp>
+        <p:nvCxnSpPr>
+          <p:cNvPr id="137" name="Straight Arrow Connector 136">
+            <a:extLst>
+              <a:ext uri="{FF2B5EF4-FFF2-40B4-BE49-F238E27FC236}">
+                <a16:creationId xmlns:a16="http://schemas.microsoft.com/office/drawing/2014/main" id="{551AAC1E-CFAD-470C-B141-BA213362D936}"/>
+              </a:ext>
+            </a:extLst>
+          </p:cNvPr>
+          <p:cNvCxnSpPr>
+            <a:cxnSpLocks/>
+          </p:cNvCxnSpPr>
+          <p:nvPr/>
+        </p:nvCxnSpPr>
+        <p:spPr>
+          <a:xfrm>
+            <a:off x="9092638" y="6972823"/>
+            <a:ext cx="958329" cy="0"/>
+          </a:xfrm>
+          <a:prstGeom prst="straightConnector1">
+            <a:avLst/>
+          </a:prstGeom>
+          <a:ln w="19050">
+            <a:solidFill>
+              <a:srgbClr val="0070C0"/>
+            </a:solidFill>
+            <a:prstDash val="sysDash"/>
+            <a:headEnd type="arrow" w="med" len="med"/>
+            <a:tailEnd type="none" w="med" len="med"/>
+          </a:ln>
+        </p:spPr>
+        <p:style>
+          <a:lnRef idx="1">
+            <a:schemeClr val="accent1"/>
+          </a:lnRef>
+          <a:fillRef idx="0">
+            <a:schemeClr val="accent1"/>
+          </a:fillRef>
+          <a:effectRef idx="0">
+            <a:schemeClr val="accent1"/>
+          </a:effectRef>
+          <a:fontRef idx="minor">
+            <a:schemeClr val="tx1"/>
+          </a:fontRef>
+        </p:style>
+      </p:cxnSp>
+      <p:cxnSp>
+        <p:nvCxnSpPr>
+          <p:cNvPr id="138" name="Straight Arrow Connector 137">
+            <a:extLst>
+              <a:ext uri="{FF2B5EF4-FFF2-40B4-BE49-F238E27FC236}">
+                <a16:creationId xmlns:a16="http://schemas.microsoft.com/office/drawing/2014/main" id="{45C4934C-A1A0-498F-A4D4-8FB0C2210EE7}"/>
+              </a:ext>
+            </a:extLst>
+          </p:cNvPr>
+          <p:cNvCxnSpPr>
+            <a:cxnSpLocks/>
+          </p:cNvCxnSpPr>
+          <p:nvPr/>
+        </p:nvCxnSpPr>
+        <p:spPr>
+          <a:xfrm flipV="1">
+            <a:off x="9149079" y="6345292"/>
+            <a:ext cx="301399" cy="1"/>
+          </a:xfrm>
+          <a:prstGeom prst="straightConnector1">
+            <a:avLst/>
+          </a:prstGeom>
+          <a:ln w="19050">
+            <a:solidFill>
+              <a:srgbClr val="0070C0"/>
+            </a:solidFill>
+            <a:tailEnd type="arrow"/>
+          </a:ln>
+        </p:spPr>
+        <p:style>
+          <a:lnRef idx="1">
+            <a:schemeClr val="accent1"/>
+          </a:lnRef>
+          <a:fillRef idx="0">
+            <a:schemeClr val="accent1"/>
+          </a:fillRef>
+          <a:effectRef idx="0">
+            <a:schemeClr val="accent1"/>
+          </a:effectRef>
+          <a:fontRef idx="minor">
+            <a:schemeClr val="tx1"/>
+          </a:fontRef>
+        </p:style>
+      </p:cxnSp>
+      <p:sp>
+        <p:nvSpPr>
+          <p:cNvPr id="140" name="Rectangle 139">
+            <a:extLst>
+              <a:ext uri="{FF2B5EF4-FFF2-40B4-BE49-F238E27FC236}">
+                <a16:creationId xmlns:a16="http://schemas.microsoft.com/office/drawing/2014/main" id="{445B2FF3-5D74-4E12-BFA6-1D504FE4B26F}"/>
+              </a:ext>
+            </a:extLst>
+          </p:cNvPr>
+          <p:cNvSpPr/>
+          <p:nvPr/>
+        </p:nvSpPr>
+        <p:spPr>
+          <a:xfrm>
+            <a:off x="5556411" y="3830693"/>
+            <a:ext cx="182445" cy="1155138"/>
+          </a:xfrm>
+          <a:prstGeom prst="rect">
+            <a:avLst/>
+          </a:prstGeom>
+          <a:solidFill>
+            <a:srgbClr val="0070C0"/>
+          </a:solidFill>
+          <a:ln>
+            <a:solidFill>
+              <a:srgbClr val="0070C0"/>
+            </a:solidFill>
+          </a:ln>
+          <a:effectLst/>
+        </p:spPr>
+        <p:style>
+          <a:lnRef idx="1">
+            <a:schemeClr val="accent3"/>
+          </a:lnRef>
+          <a:fillRef idx="2">
+            <a:schemeClr val="accent3"/>
+          </a:fillRef>
+          <a:effectRef idx="1">
+            <a:schemeClr val="accent3"/>
+          </a:effectRef>
+          <a:fontRef idx="minor">
+            <a:schemeClr val="dk1"/>
+          </a:fontRef>
+        </p:style>
+        <p:txBody>
+          <a:bodyPr rtlCol="0" anchor="ctr"/>
+          <a:lstStyle/>
+          <a:p>
+            <a:pPr algn="ctr"/>
+            <a:endParaRPr lang="en-SG" sz="1400"/>
+          </a:p>
+        </p:txBody>
+      </p:sp>
+      <p:cxnSp>
+        <p:nvCxnSpPr>
+          <p:cNvPr id="141" name="Straight Arrow Connector 140">
+            <a:extLst>
+              <a:ext uri="{FF2B5EF4-FFF2-40B4-BE49-F238E27FC236}">
+                <a16:creationId xmlns:a16="http://schemas.microsoft.com/office/drawing/2014/main" id="{E2887C97-0056-448A-8E82-0A8C9C848B8F}"/>
+              </a:ext>
+            </a:extLst>
+          </p:cNvPr>
+          <p:cNvCxnSpPr>
+            <a:cxnSpLocks/>
+          </p:cNvCxnSpPr>
+          <p:nvPr/>
+        </p:nvCxnSpPr>
+        <p:spPr>
+          <a:xfrm flipV="1">
+            <a:off x="4165200" y="3840510"/>
+            <a:ext cx="1389909" cy="1"/>
+          </a:xfrm>
+          <a:prstGeom prst="straightConnector1">
+            <a:avLst/>
+          </a:prstGeom>
+          <a:ln w="19050">
+            <a:solidFill>
+              <a:srgbClr val="0070C0"/>
+            </a:solidFill>
+            <a:tailEnd type="arrow"/>
+          </a:ln>
+        </p:spPr>
+        <p:style>
+          <a:lnRef idx="1">
+            <a:schemeClr val="accent1"/>
+          </a:lnRef>
+          <a:fillRef idx="0">
+            <a:schemeClr val="accent1"/>
+          </a:fillRef>
+          <a:effectRef idx="0">
+            <a:schemeClr val="accent1"/>
+          </a:effectRef>
+          <a:fontRef idx="minor">
+            <a:schemeClr val="tx1"/>
+          </a:fontRef>
+        </p:style>
+      </p:cxnSp>
+      <p:cxnSp>
+        <p:nvCxnSpPr>
+          <p:cNvPr id="142" name="Straight Arrow Connector 141">
+            <a:extLst>
+              <a:ext uri="{FF2B5EF4-FFF2-40B4-BE49-F238E27FC236}">
+                <a16:creationId xmlns:a16="http://schemas.microsoft.com/office/drawing/2014/main" id="{1DBF1721-60DE-4058-A897-E9F33C32F16D}"/>
+              </a:ext>
+            </a:extLst>
+          </p:cNvPr>
+          <p:cNvCxnSpPr>
+            <a:cxnSpLocks/>
+          </p:cNvCxnSpPr>
+          <p:nvPr/>
+        </p:nvCxnSpPr>
+        <p:spPr>
+          <a:xfrm>
+            <a:off x="4172046" y="4985831"/>
+            <a:ext cx="1492974" cy="0"/>
+          </a:xfrm>
+          <a:prstGeom prst="straightConnector1">
+            <a:avLst/>
+          </a:prstGeom>
+          <a:ln w="19050">
+            <a:solidFill>
+              <a:srgbClr val="0070C0"/>
+            </a:solidFill>
+            <a:prstDash val="sysDash"/>
+            <a:headEnd type="arrow" w="med" len="med"/>
+            <a:tailEnd type="none" w="med" len="med"/>
+          </a:ln>
+        </p:spPr>
+        <p:style>
+          <a:lnRef idx="1">
+            <a:schemeClr val="accent1"/>
+          </a:lnRef>
+          <a:fillRef idx="0">
+            <a:schemeClr val="accent1"/>
+          </a:fillRef>
+          <a:effectRef idx="0">
+            <a:schemeClr val="accent1"/>
+          </a:effectRef>
+          <a:fontRef idx="minor">
+            <a:schemeClr val="tx1"/>
+          </a:fontRef>
+        </p:style>
+      </p:cxnSp>
+      <p:sp>
+        <p:nvSpPr>
+          <p:cNvPr id="143" name="Rectangle 142">
+            <a:extLst>
+              <a:ext uri="{FF2B5EF4-FFF2-40B4-BE49-F238E27FC236}">
+                <a16:creationId xmlns:a16="http://schemas.microsoft.com/office/drawing/2014/main" id="{61D9D7CE-8762-4BC1-AE5A-88708657EF88}"/>
+              </a:ext>
+            </a:extLst>
+          </p:cNvPr>
+          <p:cNvSpPr/>
+          <p:nvPr/>
+        </p:nvSpPr>
+        <p:spPr>
+          <a:xfrm>
+            <a:off x="7156612" y="4042791"/>
+            <a:ext cx="152400" cy="276003"/>
+          </a:xfrm>
+          <a:prstGeom prst="rect">
+            <a:avLst/>
+          </a:prstGeom>
+          <a:solidFill>
+            <a:srgbClr val="0070C0"/>
+          </a:solidFill>
+          <a:ln>
+            <a:solidFill>
+              <a:srgbClr val="0070C0"/>
+            </a:solidFill>
+          </a:ln>
+          <a:effectLst/>
+        </p:spPr>
+        <p:style>
+          <a:lnRef idx="1">
+            <a:schemeClr val="accent3"/>
+          </a:lnRef>
+          <a:fillRef idx="2">
+            <a:schemeClr val="accent3"/>
+          </a:fillRef>
+          <a:effectRef idx="1">
+            <a:schemeClr val="accent3"/>
+          </a:effectRef>
+          <a:fontRef idx="minor">
+            <a:schemeClr val="dk1"/>
+          </a:fontRef>
+        </p:style>
+        <p:txBody>
+          <a:bodyPr rtlCol="0" anchor="ctr"/>
+          <a:lstStyle/>
+          <a:p>
+            <a:pPr algn="ctr"/>
+            <a:endParaRPr lang="en-SG" sz="1400"/>
+          </a:p>
+        </p:txBody>
+      </p:sp>
+      <p:cxnSp>
+        <p:nvCxnSpPr>
+          <p:cNvPr id="144" name="Straight Arrow Connector 143">
+            <a:extLst>
+              <a:ext uri="{FF2B5EF4-FFF2-40B4-BE49-F238E27FC236}">
+                <a16:creationId xmlns:a16="http://schemas.microsoft.com/office/drawing/2014/main" id="{29CA4779-2FA8-4422-B9E7-E8D48E1762AA}"/>
+              </a:ext>
+            </a:extLst>
+          </p:cNvPr>
+          <p:cNvCxnSpPr>
+            <a:cxnSpLocks/>
+          </p:cNvCxnSpPr>
+          <p:nvPr/>
+        </p:nvCxnSpPr>
+        <p:spPr>
+          <a:xfrm flipV="1">
+            <a:off x="5766702" y="3962718"/>
+            <a:ext cx="922392" cy="1"/>
+          </a:xfrm>
+          <a:prstGeom prst="straightConnector1">
+            <a:avLst/>
+          </a:prstGeom>
+          <a:ln w="19050">
+            <a:solidFill>
+              <a:srgbClr val="0070C0"/>
+            </a:solidFill>
+            <a:tailEnd type="arrow"/>
+          </a:ln>
+        </p:spPr>
+        <p:style>
+          <a:lnRef idx="1">
+            <a:schemeClr val="accent1"/>
+          </a:lnRef>
+          <a:fillRef idx="0">
+            <a:schemeClr val="accent1"/>
+          </a:fillRef>
+          <a:effectRef idx="0">
+            <a:schemeClr val="accent1"/>
+          </a:effectRef>
+          <a:fontRef idx="minor">
+            <a:schemeClr val="tx1"/>
+          </a:fontRef>
+        </p:style>
+      </p:cxnSp>
+      <p:cxnSp>
+        <p:nvCxnSpPr>
+          <p:cNvPr id="145" name="Straight Arrow Connector 144">
+            <a:extLst>
+              <a:ext uri="{FF2B5EF4-FFF2-40B4-BE49-F238E27FC236}">
+                <a16:creationId xmlns:a16="http://schemas.microsoft.com/office/drawing/2014/main" id="{854C961E-BF43-4D5C-8CF5-229CBE0C3BFF}"/>
+              </a:ext>
+            </a:extLst>
+          </p:cNvPr>
+          <p:cNvCxnSpPr>
+            <a:cxnSpLocks/>
+          </p:cNvCxnSpPr>
+          <p:nvPr/>
+        </p:nvCxnSpPr>
+        <p:spPr>
+          <a:xfrm>
+            <a:off x="5735773" y="4318794"/>
+            <a:ext cx="1492974" cy="0"/>
+          </a:xfrm>
+          <a:prstGeom prst="straightConnector1">
+            <a:avLst/>
+          </a:prstGeom>
+          <a:ln w="19050">
+            <a:solidFill>
+              <a:srgbClr val="0070C0"/>
+            </a:solidFill>
+            <a:prstDash val="sysDash"/>
+            <a:headEnd type="arrow" w="med" len="med"/>
+            <a:tailEnd type="none" w="med" len="med"/>
+          </a:ln>
+        </p:spPr>
+        <p:style>
+          <a:lnRef idx="1">
+            <a:schemeClr val="accent1"/>
+          </a:lnRef>
+          <a:fillRef idx="0">
+            <a:schemeClr val="accent1"/>
+          </a:fillRef>
+          <a:effectRef idx="0">
+            <a:schemeClr val="accent1"/>
+          </a:effectRef>
+          <a:fontRef idx="minor">
+            <a:schemeClr val="tx1"/>
+          </a:fontRef>
+        </p:style>
+      </p:cxnSp>
+      <p:sp>
+        <p:nvSpPr>
+          <p:cNvPr id="146" name="Rectangle 62">
+            <a:extLst>
+              <a:ext uri="{FF2B5EF4-FFF2-40B4-BE49-F238E27FC236}">
+                <a16:creationId xmlns:a16="http://schemas.microsoft.com/office/drawing/2014/main" id="{9B8EE94B-AF72-4DE9-B799-9ECF2B8FF87D}"/>
+              </a:ext>
+            </a:extLst>
+          </p:cNvPr>
+          <p:cNvSpPr/>
+          <p:nvPr/>
+        </p:nvSpPr>
+        <p:spPr>
+          <a:xfrm>
+            <a:off x="6666706" y="3404394"/>
+            <a:ext cx="1695516" cy="767790"/>
+          </a:xfrm>
+          <a:prstGeom prst="rect">
+            <a:avLst/>
+          </a:prstGeom>
+          <a:solidFill>
+            <a:srgbClr val="0070C0"/>
+          </a:solidFill>
+          <a:ln w="19050">
+            <a:solidFill>
+              <a:srgbClr val="0070C0"/>
+            </a:solidFill>
+          </a:ln>
+          <a:effectLst/>
+        </p:spPr>
+        <p:style>
+          <a:lnRef idx="1">
+            <a:schemeClr val="accent2"/>
+          </a:lnRef>
+          <a:fillRef idx="2">
+            <a:schemeClr val="accent2"/>
+          </a:fillRef>
+          <a:effectRef idx="1">
+            <a:schemeClr val="accent2"/>
+          </a:effectRef>
+          <a:fontRef idx="minor">
+            <a:schemeClr val="dk1"/>
+          </a:fontRef>
+        </p:style>
+        <p:txBody>
+          <a:bodyPr rtlCol="0" anchor="ctr"/>
+          <a:lstStyle/>
+          <a:p>
+            <a:pPr algn="ctr"/>
+            <a:r>
+              <a:rPr lang="en-US" sz="1600" dirty="0">
+                <a:solidFill>
+                  <a:schemeClr val="bg1"/>
+                </a:solidFill>
+              </a:rPr>
+              <a:t>comparator: NameComparator</a:t>
+            </a:r>
+            <a:endParaRPr lang="en-SG" sz="1600" dirty="0">
+              <a:solidFill>
+                <a:schemeClr val="bg1"/>
+              </a:solidFill>
+            </a:endParaRPr>
+          </a:p>
+        </p:txBody>
+      </p:sp>
+      <p:sp>
+        <p:nvSpPr>
+          <p:cNvPr id="147" name="TextBox 146">
+            <a:extLst>
+              <a:ext uri="{FF2B5EF4-FFF2-40B4-BE49-F238E27FC236}">
+                <a16:creationId xmlns:a16="http://schemas.microsoft.com/office/drawing/2014/main" id="{4DA724C4-81A6-4F61-8378-2A5569F1EA91}"/>
+              </a:ext>
+            </a:extLst>
+          </p:cNvPr>
+          <p:cNvSpPr txBox="1"/>
+          <p:nvPr/>
+        </p:nvSpPr>
+        <p:spPr>
+          <a:xfrm>
+            <a:off x="2664625" y="6893186"/>
+            <a:ext cx="621216" cy="215444"/>
+          </a:xfrm>
+          <a:prstGeom prst="rect">
+            <a:avLst/>
+          </a:prstGeom>
+          <a:noFill/>
+        </p:spPr>
+        <p:txBody>
+          <a:bodyPr wrap="square" lIns="0" tIns="0" rIns="0" bIns="0" rtlCol="0">
+            <a:spAutoFit/>
+          </a:bodyPr>
+          <a:lstStyle>
+            <a:defPPr>
+              <a:defRPr lang="en-US"/>
+            </a:defPPr>
+            <a:lvl1pPr algn="r">
+              <a:defRPr sz="1400">
+                <a:solidFill>
+                  <a:srgbClr val="0070C0"/>
+                </a:solidFill>
+              </a:defRPr>
+            </a:lvl1pPr>
+          </a:lstStyle>
+          <a:p>
+            <a:r>
+              <a:rPr lang="en-US"/>
+              <a:t>result</a:t>
+            </a:r>
+            <a:endParaRPr lang="en-US" dirty="0"/>
+          </a:p>
+        </p:txBody>
+      </p:sp>
+      <p:sp>
+        <p:nvSpPr>
+          <p:cNvPr id="148" name="TextBox 147">
+            <a:extLst>
+              <a:ext uri="{FF2B5EF4-FFF2-40B4-BE49-F238E27FC236}">
+                <a16:creationId xmlns:a16="http://schemas.microsoft.com/office/drawing/2014/main" id="{84EC8EB5-408F-4B36-B3E0-FBD94BD3D423}"/>
+              </a:ext>
+            </a:extLst>
+          </p:cNvPr>
+          <p:cNvSpPr txBox="1"/>
+          <p:nvPr/>
+        </p:nvSpPr>
+        <p:spPr>
+          <a:xfrm>
+            <a:off x="5741043" y="4080793"/>
+            <a:ext cx="872059" cy="215444"/>
+          </a:xfrm>
+          <a:prstGeom prst="rect">
+            <a:avLst/>
+          </a:prstGeom>
+          <a:noFill/>
+        </p:spPr>
+        <p:txBody>
+          <a:bodyPr wrap="square" lIns="0" tIns="0" rIns="0" bIns="0" rtlCol="0">
+            <a:spAutoFit/>
+          </a:bodyPr>
+          <a:lstStyle>
+            <a:defPPr>
+              <a:defRPr lang="en-US"/>
+            </a:defPPr>
+            <a:lvl1pPr algn="r">
+              <a:defRPr sz="1400">
+                <a:solidFill>
+                  <a:srgbClr val="0070C0"/>
+                </a:solidFill>
+              </a:defRPr>
+            </a:lvl1pPr>
+          </a:lstStyle>
+          <a:p>
+            <a:r>
+              <a:rPr lang="en-US"/>
+              <a:t>comparator</a:t>
+            </a:r>
+            <a:endParaRPr lang="en-US" dirty="0"/>
+          </a:p>
+        </p:txBody>
+      </p:sp>
+      <p:sp>
+        <p:nvSpPr>
+          <p:cNvPr id="149" name="Rectangle 148">
+            <a:extLst>
+              <a:ext uri="{FF2B5EF4-FFF2-40B4-BE49-F238E27FC236}">
+                <a16:creationId xmlns:a16="http://schemas.microsoft.com/office/drawing/2014/main" id="{32455A0D-7F2D-4599-AD66-06892D37D5F6}"/>
+              </a:ext>
+            </a:extLst>
+          </p:cNvPr>
+          <p:cNvSpPr/>
+          <p:nvPr/>
+        </p:nvSpPr>
+        <p:spPr>
+          <a:xfrm>
+            <a:off x="8893246" y="4509807"/>
+            <a:ext cx="231637" cy="327651"/>
+          </a:xfrm>
+          <a:prstGeom prst="rect">
+            <a:avLst/>
+          </a:prstGeom>
+          <a:solidFill>
+            <a:srgbClr val="0070C0"/>
+          </a:solidFill>
+          <a:ln>
+            <a:solidFill>
+              <a:srgbClr val="0070C0"/>
+            </a:solidFill>
+          </a:ln>
+          <a:effectLst/>
+        </p:spPr>
+        <p:style>
+          <a:lnRef idx="1">
+            <a:schemeClr val="accent3"/>
+          </a:lnRef>
+          <a:fillRef idx="2">
+            <a:schemeClr val="accent3"/>
+          </a:fillRef>
+          <a:effectRef idx="1">
+            <a:schemeClr val="accent3"/>
+          </a:effectRef>
+          <a:fontRef idx="minor">
+            <a:schemeClr val="dk1"/>
+          </a:fontRef>
+        </p:style>
+        <p:txBody>
+          <a:bodyPr rtlCol="0" anchor="ctr"/>
+          <a:lstStyle/>
+          <a:p>
+            <a:pPr algn="ctr"/>
+            <a:endParaRPr lang="en-SG" sz="1400"/>
+          </a:p>
+        </p:txBody>
+      </p:sp>
+      <p:cxnSp>
+        <p:nvCxnSpPr>
+          <p:cNvPr id="150" name="Straight Arrow Connector 149">
+            <a:extLst>
+              <a:ext uri="{FF2B5EF4-FFF2-40B4-BE49-F238E27FC236}">
+                <a16:creationId xmlns:a16="http://schemas.microsoft.com/office/drawing/2014/main" id="{EB8123D5-E7BA-4873-900B-98F9E2417E1C}"/>
+              </a:ext>
+            </a:extLst>
+          </p:cNvPr>
+          <p:cNvCxnSpPr>
+            <a:cxnSpLocks/>
+          </p:cNvCxnSpPr>
+          <p:nvPr/>
+        </p:nvCxnSpPr>
+        <p:spPr>
+          <a:xfrm>
+            <a:off x="5739838" y="4429734"/>
+            <a:ext cx="2657454" cy="1"/>
+          </a:xfrm>
+          <a:prstGeom prst="straightConnector1">
+            <a:avLst/>
+          </a:prstGeom>
+          <a:ln w="19050">
+            <a:solidFill>
+              <a:srgbClr val="0070C0"/>
+            </a:solidFill>
+            <a:tailEnd type="arrow"/>
+          </a:ln>
+        </p:spPr>
+        <p:style>
+          <a:lnRef idx="1">
+            <a:schemeClr val="accent1"/>
+          </a:lnRef>
+          <a:fillRef idx="0">
+            <a:schemeClr val="accent1"/>
+          </a:fillRef>
+          <a:effectRef idx="0">
+            <a:schemeClr val="accent1"/>
+          </a:effectRef>
+          <a:fontRef idx="minor">
+            <a:schemeClr val="tx1"/>
+          </a:fontRef>
+        </p:style>
+      </p:cxnSp>
+      <p:cxnSp>
+        <p:nvCxnSpPr>
+          <p:cNvPr id="151" name="Straight Arrow Connector 150">
+            <a:extLst>
+              <a:ext uri="{FF2B5EF4-FFF2-40B4-BE49-F238E27FC236}">
+                <a16:creationId xmlns:a16="http://schemas.microsoft.com/office/drawing/2014/main" id="{7794C066-EB26-4B26-B51A-316203A56BD6}"/>
+              </a:ext>
+            </a:extLst>
+          </p:cNvPr>
+          <p:cNvCxnSpPr>
+            <a:cxnSpLocks/>
+          </p:cNvCxnSpPr>
+          <p:nvPr/>
+        </p:nvCxnSpPr>
+        <p:spPr>
+          <a:xfrm>
+            <a:off x="5755642" y="4795626"/>
+            <a:ext cx="3235851" cy="0"/>
+          </a:xfrm>
+          <a:prstGeom prst="straightConnector1">
+            <a:avLst/>
+          </a:prstGeom>
+          <a:ln w="19050">
+            <a:solidFill>
+              <a:srgbClr val="0070C0"/>
+            </a:solidFill>
+            <a:prstDash val="sysDash"/>
+            <a:headEnd type="arrow" w="med" len="med"/>
+            <a:tailEnd type="none" w="med" len="med"/>
+          </a:ln>
+        </p:spPr>
+        <p:style>
+          <a:lnRef idx="1">
+            <a:schemeClr val="accent1"/>
+          </a:lnRef>
+          <a:fillRef idx="0">
+            <a:schemeClr val="accent1"/>
+          </a:fillRef>
+          <a:effectRef idx="0">
+            <a:schemeClr val="accent1"/>
+          </a:effectRef>
+          <a:fontRef idx="minor">
+            <a:schemeClr val="tx1"/>
+          </a:fontRef>
+        </p:style>
+      </p:cxnSp>
+      <p:sp>
+        <p:nvSpPr>
+          <p:cNvPr id="152" name="Rectangle 62">
+            <a:extLst>
+              <a:ext uri="{FF2B5EF4-FFF2-40B4-BE49-F238E27FC236}">
+                <a16:creationId xmlns:a16="http://schemas.microsoft.com/office/drawing/2014/main" id="{FED42BEA-F9AC-4695-B4B8-F8132D54C890}"/>
+              </a:ext>
+            </a:extLst>
+          </p:cNvPr>
+          <p:cNvSpPr/>
+          <p:nvPr/>
+        </p:nvSpPr>
+        <p:spPr>
+          <a:xfrm>
+            <a:off x="8397292" y="4042791"/>
+            <a:ext cx="1581651" cy="596409"/>
+          </a:xfrm>
+          <a:prstGeom prst="rect">
+            <a:avLst/>
+          </a:prstGeom>
+          <a:solidFill>
+            <a:srgbClr val="0070C0"/>
+          </a:solidFill>
+          <a:ln w="19050">
+            <a:solidFill>
+              <a:srgbClr val="0070C0"/>
+            </a:solidFill>
+          </a:ln>
+          <a:effectLst/>
+        </p:spPr>
+        <p:style>
+          <a:lnRef idx="1">
+            <a:schemeClr val="accent2"/>
+          </a:lnRef>
+          <a:fillRef idx="2">
+            <a:schemeClr val="accent2"/>
+          </a:fillRef>
+          <a:effectRef idx="1">
+            <a:schemeClr val="accent2"/>
+          </a:effectRef>
+          <a:fontRef idx="minor">
+            <a:schemeClr val="dk1"/>
+          </a:fontRef>
+        </p:style>
+        <p:txBody>
+          <a:bodyPr rtlCol="0" anchor="ctr"/>
+          <a:lstStyle/>
+          <a:p>
+            <a:pPr algn="ctr"/>
+            <a:r>
+              <a:rPr lang="en-US" sz="1600" dirty="0">
+                <a:solidFill>
+                  <a:schemeClr val="bg1"/>
+                </a:solidFill>
+              </a:rPr>
+              <a:t>:SortCommand</a:t>
+            </a:r>
+            <a:endParaRPr lang="en-SG" sz="1600" dirty="0">
+              <a:solidFill>
+                <a:schemeClr val="bg1"/>
+              </a:solidFill>
+            </a:endParaRPr>
+          </a:p>
+        </p:txBody>
+      </p:sp>
+      <p:sp>
+        <p:nvSpPr>
+          <p:cNvPr id="153" name="TextBox 152">
+            <a:extLst>
+              <a:ext uri="{FF2B5EF4-FFF2-40B4-BE49-F238E27FC236}">
+                <a16:creationId xmlns:a16="http://schemas.microsoft.com/office/drawing/2014/main" id="{DC2B20D1-DE3B-4F34-8266-146FED3EAB29}"/>
+              </a:ext>
+            </a:extLst>
+          </p:cNvPr>
+          <p:cNvSpPr txBox="1"/>
+          <p:nvPr/>
+        </p:nvSpPr>
+        <p:spPr>
+          <a:xfrm>
+            <a:off x="6523347" y="4758249"/>
+            <a:ext cx="220343" cy="215444"/>
+          </a:xfrm>
+          <a:prstGeom prst="rect">
+            <a:avLst/>
+          </a:prstGeom>
+          <a:noFill/>
+        </p:spPr>
+        <p:txBody>
+          <a:bodyPr wrap="square" lIns="0" tIns="0" rIns="0" bIns="0" rtlCol="0">
+            <a:spAutoFit/>
+          </a:bodyPr>
+          <a:lstStyle>
+            <a:defPPr>
+              <a:defRPr lang="en-US"/>
+            </a:defPPr>
+            <a:lvl1pPr algn="r">
+              <a:defRPr sz="1400">
+                <a:solidFill>
+                  <a:srgbClr val="0070C0"/>
+                </a:solidFill>
+              </a:defRPr>
+            </a:lvl1pPr>
+          </a:lstStyle>
+          <a:p>
+            <a:r>
+              <a:rPr lang="en-US"/>
+              <a:t>s</a:t>
+            </a:r>
+            <a:endParaRPr lang="en-US" dirty="0"/>
+          </a:p>
+        </p:txBody>
+      </p:sp>
+      <p:sp>
+        <p:nvSpPr>
+          <p:cNvPr id="154" name="Rectangle 153">
+            <a:extLst>
+              <a:ext uri="{FF2B5EF4-FFF2-40B4-BE49-F238E27FC236}">
+                <a16:creationId xmlns:a16="http://schemas.microsoft.com/office/drawing/2014/main" id="{1BF43A8D-0D62-4D08-8A36-378CFBE66588}"/>
+              </a:ext>
+            </a:extLst>
+          </p:cNvPr>
+          <p:cNvSpPr/>
+          <p:nvPr/>
+        </p:nvSpPr>
+        <p:spPr>
+          <a:xfrm>
+            <a:off x="8893246" y="5500871"/>
+            <a:ext cx="231637" cy="1645002"/>
+          </a:xfrm>
+          <a:prstGeom prst="rect">
+            <a:avLst/>
+          </a:prstGeom>
+          <a:solidFill>
+            <a:srgbClr val="0070C0"/>
+          </a:solidFill>
+          <a:ln>
+            <a:solidFill>
+              <a:srgbClr val="0070C0"/>
+            </a:solidFill>
+          </a:ln>
+          <a:effectLst/>
+        </p:spPr>
+        <p:style>
+          <a:lnRef idx="1">
+            <a:schemeClr val="accent3"/>
+          </a:lnRef>
+          <a:fillRef idx="2">
+            <a:schemeClr val="accent3"/>
+          </a:fillRef>
+          <a:effectRef idx="1">
+            <a:schemeClr val="accent3"/>
+          </a:effectRef>
+          <a:fontRef idx="minor">
+            <a:schemeClr val="dk1"/>
+          </a:fontRef>
+        </p:style>
+        <p:txBody>
+          <a:bodyPr rtlCol="0" anchor="ctr"/>
+          <a:lstStyle/>
+          <a:p>
+            <a:pPr algn="ctr"/>
+            <a:endParaRPr lang="en-SG" sz="1400"/>
+          </a:p>
+        </p:txBody>
+      </p:sp>
+      <p:sp>
+        <p:nvSpPr>
+          <p:cNvPr id="155" name="TextBox 154">
+            <a:extLst>
+              <a:ext uri="{FF2B5EF4-FFF2-40B4-BE49-F238E27FC236}">
+                <a16:creationId xmlns:a16="http://schemas.microsoft.com/office/drawing/2014/main" id="{C85BEAB9-DF6E-469E-A4B8-52AA42D46AE0}"/>
+              </a:ext>
+            </a:extLst>
+          </p:cNvPr>
+          <p:cNvSpPr txBox="1"/>
+          <p:nvPr/>
+        </p:nvSpPr>
+        <p:spPr>
+          <a:xfrm>
+            <a:off x="4648861" y="4750341"/>
+            <a:ext cx="220343" cy="215444"/>
+          </a:xfrm>
+          <a:prstGeom prst="rect">
+            <a:avLst/>
+          </a:prstGeom>
+          <a:noFill/>
+        </p:spPr>
+        <p:txBody>
+          <a:bodyPr wrap="square" lIns="0" tIns="0" rIns="0" bIns="0" rtlCol="0">
+            <a:spAutoFit/>
+          </a:bodyPr>
+          <a:lstStyle>
+            <a:defPPr>
+              <a:defRPr lang="en-US"/>
+            </a:defPPr>
+            <a:lvl1pPr algn="r">
+              <a:defRPr sz="1400">
+                <a:solidFill>
+                  <a:srgbClr val="0070C0"/>
+                </a:solidFill>
+              </a:defRPr>
+            </a:lvl1pPr>
+          </a:lstStyle>
+          <a:p>
+            <a:r>
+              <a:rPr lang="en-US"/>
+              <a:t>s</a:t>
+            </a:r>
+            <a:endParaRPr lang="en-US" dirty="0"/>
+          </a:p>
+        </p:txBody>
+      </p:sp>
+      <p:sp>
+        <p:nvSpPr>
+          <p:cNvPr id="156" name="TextBox 155">
+            <a:extLst>
+              <a:ext uri="{FF2B5EF4-FFF2-40B4-BE49-F238E27FC236}">
+                <a16:creationId xmlns:a16="http://schemas.microsoft.com/office/drawing/2014/main" id="{3668419D-6EE9-4204-9D09-990081E2EEC7}"/>
+              </a:ext>
+            </a:extLst>
+          </p:cNvPr>
+          <p:cNvSpPr txBox="1"/>
+          <p:nvPr/>
+        </p:nvSpPr>
+        <p:spPr>
+          <a:xfrm>
+            <a:off x="2677817" y="4837462"/>
+            <a:ext cx="220343" cy="215444"/>
+          </a:xfrm>
+          <a:prstGeom prst="rect">
+            <a:avLst/>
+          </a:prstGeom>
+          <a:noFill/>
+        </p:spPr>
+        <p:txBody>
+          <a:bodyPr wrap="square" lIns="0" tIns="0" rIns="0" bIns="0" rtlCol="0">
+            <a:spAutoFit/>
+          </a:bodyPr>
+          <a:lstStyle>
+            <a:defPPr>
+              <a:defRPr lang="en-US"/>
+            </a:defPPr>
+            <a:lvl1pPr algn="r">
+              <a:defRPr sz="1400">
+                <a:solidFill>
+                  <a:srgbClr val="0070C0"/>
+                </a:solidFill>
+              </a:defRPr>
+            </a:lvl1pPr>
+          </a:lstStyle>
+          <a:p>
+            <a:r>
+              <a:rPr lang="en-US"/>
+              <a:t>s</a:t>
+            </a:r>
+            <a:endParaRPr lang="en-US" dirty="0"/>
+          </a:p>
+        </p:txBody>
+      </p:sp>
+      <p:sp>
+        <p:nvSpPr>
+          <p:cNvPr id="157" name="TextBox 156">
+            <a:extLst>
+              <a:ext uri="{FF2B5EF4-FFF2-40B4-BE49-F238E27FC236}">
+                <a16:creationId xmlns:a16="http://schemas.microsoft.com/office/drawing/2014/main" id="{46D2E6D5-5B59-4114-BC12-29DB90D5B3DF}"/>
+              </a:ext>
+            </a:extLst>
+          </p:cNvPr>
+          <p:cNvSpPr txBox="1"/>
+          <p:nvPr/>
+        </p:nvSpPr>
+        <p:spPr>
+          <a:xfrm>
+            <a:off x="3867072" y="3860154"/>
+            <a:ext cx="1979855" cy="215444"/>
+          </a:xfrm>
+          <a:prstGeom prst="rect">
+            <a:avLst/>
+          </a:prstGeom>
+          <a:noFill/>
+        </p:spPr>
+        <p:txBody>
+          <a:bodyPr wrap="square" lIns="0" tIns="0" rIns="0" bIns="0" rtlCol="0">
+            <a:spAutoFit/>
+          </a:bodyPr>
+          <a:lstStyle>
+            <a:defPPr>
+              <a:defRPr lang="en-US"/>
+            </a:defPPr>
+            <a:lvl1pPr algn="r">
+              <a:defRPr sz="1400">
+                <a:solidFill>
+                  <a:srgbClr val="0070C0"/>
+                </a:solidFill>
+              </a:defRPr>
+            </a:lvl1pPr>
+          </a:lstStyle>
+          <a:p>
+            <a:pPr algn="ctr"/>
+            <a:r>
+              <a:rPr lang="en-US" dirty="0"/>
+              <a:t>parse(“name”)</a:t>
+            </a:r>
+          </a:p>
+        </p:txBody>
+      </p:sp>
+      <p:sp>
+        <p:nvSpPr>
+          <p:cNvPr id="158" name="TextBox 157">
+            <a:extLst>
+              <a:ext uri="{FF2B5EF4-FFF2-40B4-BE49-F238E27FC236}">
+                <a16:creationId xmlns:a16="http://schemas.microsoft.com/office/drawing/2014/main" id="{21424C48-A01F-4A6E-8DC5-BB584577D5D3}"/>
+              </a:ext>
+            </a:extLst>
+          </p:cNvPr>
+          <p:cNvSpPr txBox="1"/>
+          <p:nvPr/>
+        </p:nvSpPr>
+        <p:spPr>
+          <a:xfrm>
+            <a:off x="6012669" y="4431123"/>
+            <a:ext cx="2317969" cy="215444"/>
+          </a:xfrm>
+          <a:prstGeom prst="rect">
+            <a:avLst/>
+          </a:prstGeom>
+          <a:noFill/>
+        </p:spPr>
+        <p:txBody>
+          <a:bodyPr wrap="square" lIns="0" tIns="0" rIns="0" bIns="0" rtlCol="0">
+            <a:spAutoFit/>
+          </a:bodyPr>
+          <a:lstStyle>
+            <a:defPPr>
+              <a:defRPr lang="en-US"/>
+            </a:defPPr>
+            <a:lvl1pPr algn="r">
+              <a:defRPr sz="1400">
+                <a:solidFill>
+                  <a:srgbClr val="0070C0"/>
+                </a:solidFill>
+              </a:defRPr>
+            </a:lvl1pPr>
+          </a:lstStyle>
+          <a:p>
+            <a:pPr algn="ctr"/>
+            <a:r>
+              <a:rPr lang="en-US" dirty="0"/>
+              <a:t>SortCommand(comparator)</a:t>
+            </a:r>
+          </a:p>
+        </p:txBody>
+      </p:sp>
+      <p:sp>
+        <p:nvSpPr>
+          <p:cNvPr id="159" name="TextBox 158">
+            <a:extLst>
+              <a:ext uri="{FF2B5EF4-FFF2-40B4-BE49-F238E27FC236}">
+                <a16:creationId xmlns:a16="http://schemas.microsoft.com/office/drawing/2014/main" id="{D342A810-B40A-4097-8367-CF92B74D8B96}"/>
+              </a:ext>
+            </a:extLst>
+          </p:cNvPr>
+          <p:cNvSpPr txBox="1"/>
+          <p:nvPr/>
+        </p:nvSpPr>
+        <p:spPr>
+          <a:xfrm>
+            <a:off x="9296080" y="5198360"/>
+            <a:ext cx="1625042" cy="369332"/>
+          </a:xfrm>
+          <a:prstGeom prst="rect">
+            <a:avLst/>
+          </a:prstGeom>
+          <a:noFill/>
+        </p:spPr>
+        <p:txBody>
+          <a:bodyPr wrap="square" lIns="0" tIns="0" rIns="0" bIns="0" rtlCol="0">
+            <a:spAutoFit/>
+          </a:bodyPr>
+          <a:lstStyle>
+            <a:defPPr>
+              <a:defRPr lang="en-US"/>
+            </a:defPPr>
+            <a:lvl1pPr algn="r">
+              <a:defRPr sz="1400">
+                <a:solidFill>
+                  <a:srgbClr val="0070C0"/>
+                </a:solidFill>
+              </a:defRPr>
+            </a:lvl1pPr>
+          </a:lstStyle>
+          <a:p>
+            <a:pPr algn="ctr"/>
+            <a:r>
+              <a:rPr lang="en-US" sz="1200" dirty="0">
+                <a:solidFill>
+                  <a:schemeClr val="accent4">
+                    <a:lumMod val="75000"/>
+                  </a:schemeClr>
+                </a:solidFill>
+              </a:rPr>
+              <a:t>sortFilteredEquipment</a:t>
+            </a:r>
+          </a:p>
+          <a:p>
+            <a:pPr algn="ctr"/>
+            <a:r>
+              <a:rPr lang="en-US" sz="1200" dirty="0">
+                <a:solidFill>
+                  <a:schemeClr val="accent4">
+                    <a:lumMod val="75000"/>
+                  </a:schemeClr>
+                </a:solidFill>
+              </a:rPr>
+              <a:t>List(comparator)</a:t>
+            </a:r>
+            <a:endParaRPr lang="en-US" sz="1200" dirty="0"/>
+          </a:p>
+        </p:txBody>
+      </p:sp>
+      <p:cxnSp>
+        <p:nvCxnSpPr>
+          <p:cNvPr id="160" name="Straight Arrow Connector 159">
+            <a:extLst>
+              <a:ext uri="{FF2B5EF4-FFF2-40B4-BE49-F238E27FC236}">
+                <a16:creationId xmlns:a16="http://schemas.microsoft.com/office/drawing/2014/main" id="{56484D57-7376-4525-AA78-BF17537BC847}"/>
+              </a:ext>
+            </a:extLst>
+          </p:cNvPr>
+          <p:cNvCxnSpPr>
+            <a:cxnSpLocks/>
+          </p:cNvCxnSpPr>
+          <p:nvPr/>
+        </p:nvCxnSpPr>
+        <p:spPr>
+          <a:xfrm>
+            <a:off x="9141682" y="5624010"/>
+            <a:ext cx="2190164" cy="0"/>
+          </a:xfrm>
+          <a:prstGeom prst="straightConnector1">
+            <a:avLst/>
+          </a:prstGeom>
+          <a:ln w="19050">
+            <a:solidFill>
+              <a:srgbClr val="0070C0"/>
+            </a:solidFill>
+            <a:tailEnd type="arrow"/>
+          </a:ln>
+        </p:spPr>
+        <p:style>
+          <a:lnRef idx="1">
+            <a:schemeClr val="accent1"/>
+          </a:lnRef>
+          <a:fillRef idx="0">
+            <a:schemeClr val="accent1"/>
+          </a:fillRef>
+          <a:effectRef idx="0">
+            <a:schemeClr val="accent1"/>
+          </a:effectRef>
+          <a:fontRef idx="minor">
+            <a:schemeClr val="tx1"/>
+          </a:fontRef>
+        </p:style>
+      </p:cxnSp>
+      <p:cxnSp>
+        <p:nvCxnSpPr>
+          <p:cNvPr id="162" name="Straight Connector 161">
+            <a:extLst>
+              <a:ext uri="{FF2B5EF4-FFF2-40B4-BE49-F238E27FC236}">
+                <a16:creationId xmlns:a16="http://schemas.microsoft.com/office/drawing/2014/main" id="{F7FCD0D9-E4F5-4441-A7B7-2BC6C2274F8C}"/>
+              </a:ext>
+            </a:extLst>
+          </p:cNvPr>
+          <p:cNvCxnSpPr>
+            <a:cxnSpLocks/>
+          </p:cNvCxnSpPr>
+          <p:nvPr/>
+        </p:nvCxnSpPr>
+        <p:spPr>
+          <a:xfrm>
+            <a:off x="10019506" y="6782230"/>
+            <a:ext cx="0" cy="1041764"/>
+          </a:xfrm>
+          <a:prstGeom prst="line">
+            <a:avLst/>
+          </a:prstGeom>
+          <a:ln w="19050">
+            <a:solidFill>
+              <a:srgbClr val="0070C0"/>
+            </a:solidFill>
+            <a:prstDash val="sysDash"/>
+          </a:ln>
+          <a:effectLst/>
+        </p:spPr>
+        <p:style>
+          <a:lnRef idx="1">
+            <a:schemeClr val="accent1"/>
+          </a:lnRef>
+          <a:fillRef idx="2">
+            <a:schemeClr val="accent1"/>
+          </a:fillRef>
+          <a:effectRef idx="1">
+            <a:schemeClr val="accent1"/>
+          </a:effectRef>
+          <a:fontRef idx="minor">
+            <a:schemeClr val="dk1"/>
+          </a:fontRef>
+        </p:style>
+      </p:cxnSp>
+      <p:cxnSp>
+        <p:nvCxnSpPr>
+          <p:cNvPr id="161" name="Straight Arrow Connector 160">
+            <a:extLst>
+              <a:ext uri="{FF2B5EF4-FFF2-40B4-BE49-F238E27FC236}">
+                <a16:creationId xmlns:a16="http://schemas.microsoft.com/office/drawing/2014/main" id="{7C0D96BE-65B3-45E2-A66A-70D1CBDA5FB3}"/>
+              </a:ext>
+            </a:extLst>
+          </p:cNvPr>
+          <p:cNvCxnSpPr>
+            <a:cxnSpLocks/>
+          </p:cNvCxnSpPr>
+          <p:nvPr/>
+        </p:nvCxnSpPr>
+        <p:spPr>
+          <a:xfrm>
+            <a:off x="9092638" y="5967779"/>
+            <a:ext cx="2257428" cy="0"/>
+          </a:xfrm>
+          <a:prstGeom prst="straightConnector1">
+            <a:avLst/>
+          </a:prstGeom>
+          <a:ln w="19050">
+            <a:solidFill>
+              <a:srgbClr val="7030A0"/>
+            </a:solidFill>
+            <a:prstDash val="sysDash"/>
+            <a:headEnd type="arrow" w="med" len="med"/>
+            <a:tailEnd type="none" w="med" len="med"/>
+          </a:ln>
+        </p:spPr>
+        <p:style>
+          <a:lnRef idx="1">
+            <a:schemeClr val="accent1"/>
+          </a:lnRef>
+          <a:fillRef idx="0">
+            <a:schemeClr val="accent1"/>
+          </a:fillRef>
+          <a:effectRef idx="0">
+            <a:schemeClr val="accent1"/>
+          </a:effectRef>
+          <a:fontRef idx="minor">
+            <a:schemeClr val="tx1"/>
+          </a:fontRef>
+        </p:style>
+      </p:cxnSp>
+      <p:sp>
+        <p:nvSpPr>
+          <p:cNvPr id="174" name="Rectangle 62">
+            <a:extLst>
+              <a:ext uri="{FF2B5EF4-FFF2-40B4-BE49-F238E27FC236}">
+                <a16:creationId xmlns:a16="http://schemas.microsoft.com/office/drawing/2014/main" id="{FB9157C6-C450-407C-AA5F-64369B48F690}"/>
+              </a:ext>
+            </a:extLst>
+          </p:cNvPr>
+          <p:cNvSpPr/>
+          <p:nvPr/>
+        </p:nvSpPr>
+        <p:spPr>
+          <a:xfrm>
+            <a:off x="13671211" y="5276546"/>
+            <a:ext cx="2063295" cy="347464"/>
+          </a:xfrm>
+          <a:prstGeom prst="rect">
+            <a:avLst/>
+          </a:prstGeom>
+          <a:solidFill>
+            <a:srgbClr val="7030A0"/>
+          </a:solidFill>
+          <a:ln w="19050">
+            <a:solidFill>
+              <a:srgbClr val="7030A0"/>
+            </a:solidFill>
+          </a:ln>
+          <a:effectLst/>
+        </p:spPr>
+        <p:style>
+          <a:lnRef idx="1">
+            <a:schemeClr val="accent2"/>
+          </a:lnRef>
+          <a:fillRef idx="2">
+            <a:schemeClr val="accent2"/>
+          </a:fillRef>
+          <a:effectRef idx="1">
+            <a:schemeClr val="accent2"/>
+          </a:effectRef>
+          <a:fontRef idx="minor">
+            <a:schemeClr val="dk1"/>
+          </a:fontRef>
+        </p:style>
+        <p:txBody>
+          <a:bodyPr rtlCol="0" anchor="ctr"/>
+          <a:lstStyle/>
+          <a:p>
+            <a:pPr algn="ctr"/>
+            <a:r>
+              <a:rPr lang="en-US" sz="1600" dirty="0">
+                <a:solidFill>
+                  <a:schemeClr val="bg1"/>
+                </a:solidFill>
+              </a:rPr>
+              <a:t>:UniqueEquipmentList</a:t>
+            </a:r>
+            <a:endParaRPr lang="en-SG" sz="1600" dirty="0">
+              <a:solidFill>
+                <a:schemeClr val="bg1"/>
+              </a:solidFill>
+            </a:endParaRPr>
+          </a:p>
+        </p:txBody>
+      </p:sp>
+      <p:sp>
+        <p:nvSpPr>
+          <p:cNvPr id="135" name="Rectangle 62">
+            <a:extLst>
+              <a:ext uri="{FF2B5EF4-FFF2-40B4-BE49-F238E27FC236}">
+                <a16:creationId xmlns:a16="http://schemas.microsoft.com/office/drawing/2014/main" id="{623E891A-E29E-43A9-B125-823FC63CDD48}"/>
+              </a:ext>
+            </a:extLst>
+          </p:cNvPr>
+          <p:cNvSpPr/>
+          <p:nvPr/>
+        </p:nvSpPr>
+        <p:spPr>
+          <a:xfrm>
+            <a:off x="9454676" y="6157410"/>
+            <a:ext cx="1128267" cy="668841"/>
+          </a:xfrm>
+          <a:prstGeom prst="rect">
+            <a:avLst/>
+          </a:prstGeom>
+          <a:solidFill>
+            <a:srgbClr val="0070C0"/>
+          </a:solidFill>
+          <a:ln w="19050">
+            <a:solidFill>
+              <a:srgbClr val="0070C0"/>
+            </a:solidFill>
+          </a:ln>
+          <a:effectLst/>
+        </p:spPr>
+        <p:style>
+          <a:lnRef idx="1">
+            <a:schemeClr val="accent2"/>
+          </a:lnRef>
+          <a:fillRef idx="2">
+            <a:schemeClr val="accent2"/>
+          </a:fillRef>
+          <a:effectRef idx="1">
+            <a:schemeClr val="accent2"/>
+          </a:effectRef>
+          <a:fontRef idx="minor">
+            <a:schemeClr val="dk1"/>
+          </a:fontRef>
+        </p:style>
+        <p:txBody>
+          <a:bodyPr rtlCol="0" anchor="ctr"/>
+          <a:lstStyle/>
+          <a:p>
+            <a:pPr algn="ctr"/>
+            <a:r>
+              <a:rPr lang="en-US" sz="1600" dirty="0">
+                <a:solidFill>
+                  <a:schemeClr val="bg1"/>
+                </a:solidFill>
+              </a:rPr>
+              <a:t>result: Command Result</a:t>
+            </a:r>
+            <a:endParaRPr lang="en-SG" sz="1600" dirty="0">
+              <a:solidFill>
+                <a:schemeClr val="bg1"/>
+              </a:solidFill>
+            </a:endParaRPr>
+          </a:p>
+        </p:txBody>
+      </p:sp>
     </p:spTree>
     <p:extLst>
       <p:ext uri="{BB962C8B-B14F-4D97-AF65-F5344CB8AC3E}">

</xml_diff>